<commit_message>
presentation and estetics buttons
</commit_message>
<xml_diff>
--- a/presentation.pptx
+++ b/presentation.pptx
@@ -5,14 +5,18 @@
     <p:sldMasterId id="2147483684" r:id="rId1"/>
   </p:sldMasterIdLst>
   <p:notesMasterIdLst>
-    <p:notesMasterId r:id="rId4"/>
+    <p:notesMasterId r:id="rId8"/>
   </p:notesMasterIdLst>
   <p:handoutMasterIdLst>
-    <p:handoutMasterId r:id="rId5"/>
+    <p:handoutMasterId r:id="rId9"/>
   </p:handoutMasterIdLst>
   <p:sldIdLst>
     <p:sldId id="256" r:id="rId2"/>
     <p:sldId id="271" r:id="rId3"/>
+    <p:sldId id="272" r:id="rId4"/>
+    <p:sldId id="273" r:id="rId5"/>
+    <p:sldId id="274" r:id="rId6"/>
+    <p:sldId id="275" r:id="rId7"/>
   </p:sldIdLst>
   <p:sldSz cx="12192000" cy="6858000"/>
   <p:notesSz cx="6858000" cy="9144000"/>
@@ -122,6 +126,10 @@
         <p14:section name="Конструктор, трансформация, добавление заметок, совместная работа, помощник" id="{B9B51309-D148-4332-87C2-07BE32FBCA3B}">
           <p14:sldIdLst>
             <p14:sldId id="271"/>
+            <p14:sldId id="272"/>
+            <p14:sldId id="273"/>
+            <p14:sldId id="274"/>
+            <p14:sldId id="275"/>
           </p14:sldIdLst>
         </p14:section>
         <p14:section name="Подробнее" id="{2CC34DB2-6590-42C0-AD4B-A04C6060184E}">
@@ -5074,7 +5082,7 @@
                   <a:schemeClr val="bg1"/>
                 </a:solidFill>
               </a:rPr>
-              <a:t> В</a:t>
+              <a:t> Владимирович</a:t>
             </a:r>
             <a:endParaRPr lang="en-US" sz="2000" dirty="0">
               <a:solidFill>
@@ -5281,6 +5289,284 @@
   <p:clrMapOvr>
     <a:masterClrMapping/>
   </p:clrMapOvr>
+</p:sld>
+</file>
+
+<file path=ppt/slides/slide2.xml><?xml version="1.0" encoding="utf-8"?>
+<p:sld xmlns:a="http://schemas.openxmlformats.org/drawingml/2006/main" xmlns:r="http://schemas.openxmlformats.org/officeDocument/2006/relationships" xmlns:p="http://schemas.openxmlformats.org/presentationml/2006/main">
+  <p:cSld>
+    <p:bg>
+      <p:bgPr>
+        <a:solidFill>
+          <a:srgbClr val="000000"/>
+        </a:solidFill>
+        <a:effectLst/>
+      </p:bgPr>
+    </p:bg>
+    <p:spTree>
+      <p:nvGrpSpPr>
+        <p:cNvPr id="1" name=""/>
+        <p:cNvGrpSpPr/>
+        <p:nvPr/>
+      </p:nvGrpSpPr>
+      <p:grpSpPr>
+        <a:xfrm>
+          <a:off x="0" y="0"/>
+          <a:ext cx="0" cy="0"/>
+          <a:chOff x="0" y="0"/>
+          <a:chExt cx="0" cy="0"/>
+        </a:xfrm>
+      </p:grpSpPr>
+      <p:sp>
+        <p:nvSpPr>
+          <p:cNvPr id="38" name="Rectangle 33">
+            <a:extLst>
+              <a:ext uri="{FF2B5EF4-FFF2-40B4-BE49-F238E27FC236}">
+                <a16:creationId xmlns:a16="http://schemas.microsoft.com/office/drawing/2014/main" id="{71B2258F-86CA-4D4D-8270-BC05FCDEBFB3}"/>
+              </a:ext>
+              <a:ext uri="{C183D7F6-B498-43B3-948B-1728B52AA6E4}">
+                <adec:decorative xmlns:adec="http://schemas.microsoft.com/office/drawing/2017/decorative" val="1"/>
+              </a:ext>
+            </a:extLst>
+          </p:cNvPr>
+          <p:cNvSpPr>
+            <a:spLocks noGrp="1" noRot="1" noChangeAspect="1" noMove="1" noResize="1" noEditPoints="1" noAdjustHandles="1" noChangeArrowheads="1" noChangeShapeType="1" noTextEdit="1"/>
+          </p:cNvSpPr>
+          <p:nvPr>
+            <p:extLst>
+              <p:ext uri="{386F3935-93C4-4BCD-93E2-E3B085C9AB24}">
+                <p16:designElem xmlns:p16="http://schemas.microsoft.com/office/powerpoint/2015/main" val="1"/>
+              </p:ext>
+            </p:extLst>
+          </p:nvPr>
+        </p:nvSpPr>
+        <p:spPr>
+          <a:xfrm>
+            <a:off x="0" y="0"/>
+            <a:ext cx="12192000" cy="6857999"/>
+          </a:xfrm>
+          <a:prstGeom prst="rect">
+            <a:avLst/>
+          </a:prstGeom>
+          <a:solidFill>
+            <a:srgbClr val="000000"/>
+          </a:solidFill>
+          <a:ln>
+            <a:noFill/>
+          </a:ln>
+        </p:spPr>
+        <p:style>
+          <a:lnRef idx="2">
+            <a:schemeClr val="accent1">
+              <a:shade val="50000"/>
+            </a:schemeClr>
+          </a:lnRef>
+          <a:fillRef idx="1">
+            <a:schemeClr val="accent1"/>
+          </a:fillRef>
+          <a:effectRef idx="0">
+            <a:schemeClr val="accent1"/>
+          </a:effectRef>
+          <a:fontRef idx="minor">
+            <a:schemeClr val="lt1"/>
+          </a:fontRef>
+        </p:style>
+        <p:txBody>
+          <a:bodyPr rtlCol="0" anchor="ctr"/>
+          <a:lstStyle/>
+          <a:p>
+            <a:pPr algn="ctr"/>
+            <a:endParaRPr lang="en-US"/>
+          </a:p>
+        </p:txBody>
+      </p:sp>
+      <p:pic>
+        <p:nvPicPr>
+          <p:cNvPr id="9" name="Рисунок 8" descr="Изображение выглядит как мультфильм, снимок экрана, Цвет Majorelle blue, свет&#10;&#10;Автоматически созданное описание">
+            <a:extLst>
+              <a:ext uri="{FF2B5EF4-FFF2-40B4-BE49-F238E27FC236}">
+                <a16:creationId xmlns:a16="http://schemas.microsoft.com/office/drawing/2014/main" id="{39E12878-546E-B658-22BB-3347C7AFD025}"/>
+              </a:ext>
+            </a:extLst>
+          </p:cNvPr>
+          <p:cNvPicPr>
+            <a:picLocks noChangeAspect="1"/>
+          </p:cNvPicPr>
+          <p:nvPr/>
+        </p:nvPicPr>
+        <p:blipFill rotWithShape="1">
+          <a:blip r:embed="rId3">
+            <a:alphaModFix amt="50000"/>
+          </a:blip>
+          <a:srcRect l="889" r="-1" b="-1"/>
+          <a:stretch/>
+        </p:blipFill>
+        <p:spPr>
+          <a:xfrm>
+            <a:off x="20" y="-1"/>
+            <a:ext cx="12191980" cy="6857999"/>
+          </a:xfrm>
+          <a:prstGeom prst="rect">
+            <a:avLst/>
+          </a:prstGeom>
+        </p:spPr>
+      </p:pic>
+      <p:sp>
+        <p:nvSpPr>
+          <p:cNvPr id="5" name="Заголовок 4">
+            <a:extLst>
+              <a:ext uri="{FF2B5EF4-FFF2-40B4-BE49-F238E27FC236}">
+                <a16:creationId xmlns:a16="http://schemas.microsoft.com/office/drawing/2014/main" id="{A953DF3A-C079-63DF-EF89-05659766C60D}"/>
+              </a:ext>
+            </a:extLst>
+          </p:cNvPr>
+          <p:cNvSpPr>
+            <a:spLocks noGrp="1"/>
+          </p:cNvSpPr>
+          <p:nvPr>
+            <p:ph type="title"/>
+          </p:nvPr>
+        </p:nvSpPr>
+        <p:spPr>
+          <a:xfrm>
+            <a:off x="3592285" y="0"/>
+            <a:ext cx="5007429" cy="981100"/>
+          </a:xfrm>
+        </p:spPr>
+        <p:txBody>
+          <a:bodyPr vert="horz" lIns="91440" tIns="45720" rIns="91440" bIns="45720" rtlCol="0" anchor="b">
+            <a:normAutofit/>
+          </a:bodyPr>
+          <a:lstStyle/>
+          <a:p>
+            <a:pPr algn="ctr"/>
+            <a:r>
+              <a:rPr lang="en-US" sz="6000" dirty="0" err="1">
+                <a:solidFill>
+                  <a:srgbClr val="FFFFFF"/>
+                </a:solidFill>
+              </a:rPr>
+              <a:t>Идея</a:t>
+            </a:r>
+            <a:r>
+              <a:rPr lang="en-US" sz="6000" dirty="0">
+                <a:solidFill>
+                  <a:srgbClr val="FFFFFF"/>
+                </a:solidFill>
+              </a:rPr>
+              <a:t> </a:t>
+            </a:r>
+            <a:r>
+              <a:rPr lang="en-US" sz="6000" dirty="0" err="1">
+                <a:solidFill>
+                  <a:srgbClr val="FFFFFF"/>
+                </a:solidFill>
+              </a:rPr>
+              <a:t>создания</a:t>
+            </a:r>
+            <a:endParaRPr lang="en-US" sz="6000" dirty="0">
+              <a:solidFill>
+                <a:srgbClr val="FFFFFF"/>
+              </a:solidFill>
+            </a:endParaRPr>
+          </a:p>
+        </p:txBody>
+      </p:sp>
+      <p:sp>
+        <p:nvSpPr>
+          <p:cNvPr id="10" name="TextBox 9">
+            <a:extLst>
+              <a:ext uri="{FF2B5EF4-FFF2-40B4-BE49-F238E27FC236}">
+                <a16:creationId xmlns:a16="http://schemas.microsoft.com/office/drawing/2014/main" id="{4CCC0A2D-28D9-8DB4-4341-CCE94B945922}"/>
+              </a:ext>
+            </a:extLst>
+          </p:cNvPr>
+          <p:cNvSpPr txBox="1"/>
+          <p:nvPr/>
+        </p:nvSpPr>
+        <p:spPr>
+          <a:xfrm>
+            <a:off x="3684165" y="1501629"/>
+            <a:ext cx="4813883" cy="830997"/>
+          </a:xfrm>
+          <a:prstGeom prst="rect">
+            <a:avLst/>
+          </a:prstGeom>
+          <a:noFill/>
+        </p:spPr>
+        <p:txBody>
+          <a:bodyPr wrap="square" rtlCol="0">
+            <a:spAutoFit/>
+          </a:bodyPr>
+          <a:lstStyle/>
+          <a:p>
+            <a:r>
+              <a:rPr lang="ru-RU" sz="2400" dirty="0">
+                <a:effectLst/>
+                <a:latin typeface="XO Thames"/>
+                <a:ea typeface="Times New Roman" panose="02020603050405020304" pitchFamily="18" charset="0"/>
+                <a:cs typeface="Times New Roman" panose="02020603050405020304" pitchFamily="18" charset="0"/>
+              </a:rPr>
+              <a:t>Создание пиксельную </a:t>
+            </a:r>
+            <a:r>
+              <a:rPr lang="ru-RU" sz="2400" dirty="0" err="1">
+                <a:effectLst/>
+                <a:latin typeface="XO Thames"/>
+                <a:ea typeface="Times New Roman" panose="02020603050405020304" pitchFamily="18" charset="0"/>
+                <a:cs typeface="Times New Roman" panose="02020603050405020304" pitchFamily="18" charset="0"/>
+              </a:rPr>
+              <a:t>roguelike</a:t>
+            </a:r>
+            <a:r>
+              <a:rPr lang="ru-RU" sz="2400" dirty="0">
+                <a:effectLst/>
+                <a:latin typeface="XO Thames"/>
+                <a:ea typeface="Times New Roman" panose="02020603050405020304" pitchFamily="18" charset="0"/>
+                <a:cs typeface="Times New Roman" panose="02020603050405020304" pitchFamily="18" charset="0"/>
+              </a:rPr>
+              <a:t>-RPG в стиле игры ''</a:t>
+            </a:r>
+            <a:r>
+              <a:rPr lang="ru-RU" sz="2400" dirty="0" err="1">
+                <a:effectLst/>
+                <a:latin typeface="XO Thames"/>
+                <a:ea typeface="Times New Roman" panose="02020603050405020304" pitchFamily="18" charset="0"/>
+                <a:cs typeface="Times New Roman" panose="02020603050405020304" pitchFamily="18" charset="0"/>
+              </a:rPr>
+              <a:t>Soul</a:t>
+            </a:r>
+            <a:r>
+              <a:rPr lang="ru-RU" sz="2400" dirty="0">
+                <a:effectLst/>
+                <a:latin typeface="XO Thames"/>
+                <a:ea typeface="Times New Roman" panose="02020603050405020304" pitchFamily="18" charset="0"/>
+                <a:cs typeface="Times New Roman" panose="02020603050405020304" pitchFamily="18" charset="0"/>
+              </a:rPr>
+              <a:t> Knight''</a:t>
+            </a:r>
+            <a:endParaRPr lang="ru-RU" sz="2400" dirty="0"/>
+          </a:p>
+        </p:txBody>
+      </p:sp>
+    </p:spTree>
+    <p:extLst>
+      <p:ext uri="{BB962C8B-B14F-4D97-AF65-F5344CB8AC3E}">
+        <p14:creationId xmlns:p14="http://schemas.microsoft.com/office/powerpoint/2010/main" val="3457616166"/>
+      </p:ext>
+    </p:extLst>
+  </p:cSld>
+  <p:clrMapOvr>
+    <a:overrideClrMapping bg1="dk1" tx1="lt1" bg2="dk2" tx2="lt2" accent1="accent1" accent2="accent2" accent3="accent3" accent4="accent4" accent5="accent5" accent6="accent6" hlink="hlink" folHlink="folHlink"/>
+  </p:clrMapOvr>
+  <mc:AlternateContent xmlns:mc="http://schemas.openxmlformats.org/markup-compatibility/2006" xmlns:p14="http://schemas.microsoft.com/office/powerpoint/2010/main">
+    <mc:Choice Requires="p14">
+      <p:transition p14:dur="10"/>
+    </mc:Choice>
+    <mc:Fallback xmlns="">
+      <p:transition/>
+    </mc:Fallback>
+  </mc:AlternateContent>
   <p:timing>
     <p:tnLst>
       <p:par>
@@ -5309,7 +5595,7 @@
                                   <p:stCondLst>
                                     <p:cond delay="1000"/>
                                   </p:stCondLst>
-                                  <p:iterate type="lt">
+                                  <p:iterate>
                                     <p:tmPct val="10000"/>
                                   </p:iterate>
                                   <p:childTnLst>
@@ -5321,7 +5607,7 @@
                                           </p:stCondLst>
                                         </p:cTn>
                                         <p:tgtEl>
-                                          <p:spTgt spid="2"/>
+                                          <p:spTgt spid="5"/>
                                         </p:tgtEl>
                                         <p:attrNameLst>
                                           <p:attrName>style.visibility</p:attrName>
@@ -5333,34 +5619,48 @@
                                     </p:set>
                                     <p:animEffect transition="in" filter="fade">
                                       <p:cBhvr>
-                                        <p:cTn id="7" dur="400"/>
+                                        <p:cTn id="7" dur="700"/>
                                         <p:tgtEl>
-                                          <p:spTgt spid="2"/>
+                                          <p:spTgt spid="5"/>
                                         </p:tgtEl>
                                       </p:cBhvr>
                                     </p:animEffect>
                                   </p:childTnLst>
                                 </p:cTn>
                               </p:par>
+                            </p:childTnLst>
+                          </p:cTn>
+                        </p:par>
+                      </p:childTnLst>
+                    </p:cTn>
+                  </p:par>
+                  <p:par>
+                    <p:cTn id="8" fill="hold">
+                      <p:stCondLst>
+                        <p:cond delay="indefinite"/>
+                      </p:stCondLst>
+                      <p:childTnLst>
+                        <p:par>
+                          <p:cTn id="9" fill="hold">
+                            <p:stCondLst>
+                              <p:cond delay="0"/>
+                            </p:stCondLst>
+                            <p:childTnLst>
                               <p:par>
-                                <p:cTn id="8" presetID="10" presetClass="entr" presetSubtype="0" fill="hold" grpId="0" nodeType="withEffect">
+                                <p:cTn id="10" presetID="10" presetClass="entr" presetSubtype="0" fill="hold" grpId="0" nodeType="clickEffect">
                                   <p:stCondLst>
-                                    <p:cond delay="2000"/>
+                                    <p:cond delay="0"/>
                                   </p:stCondLst>
                                   <p:childTnLst>
                                     <p:set>
                                       <p:cBhvr>
-                                        <p:cTn id="9" dur="1" fill="hold">
+                                        <p:cTn id="11" dur="1" fill="hold">
                                           <p:stCondLst>
                                             <p:cond delay="0"/>
                                           </p:stCondLst>
                                         </p:cTn>
                                         <p:tgtEl>
-                                          <p:spTgt spid="3">
-                                            <p:txEl>
-                                              <p:pRg st="0" end="0"/>
-                                            </p:txEl>
-                                          </p:spTgt>
+                                          <p:spTgt spid="10"/>
                                         </p:tgtEl>
                                         <p:attrNameLst>
                                           <p:attrName>style.visibility</p:attrName>
@@ -5372,99 +5672,9 @@
                                     </p:set>
                                     <p:animEffect transition="in" filter="fade">
                                       <p:cBhvr>
-                                        <p:cTn id="10" dur="500"/>
+                                        <p:cTn id="12" dur="500"/>
                                         <p:tgtEl>
-                                          <p:spTgt spid="3">
-                                            <p:txEl>
-                                              <p:pRg st="0" end="0"/>
-                                            </p:txEl>
-                                          </p:spTgt>
-                                        </p:tgtEl>
-                                      </p:cBhvr>
-                                    </p:animEffect>
-                                  </p:childTnLst>
-                                </p:cTn>
-                              </p:par>
-                              <p:par>
-                                <p:cTn id="11" presetID="10" presetClass="entr" presetSubtype="0" fill="hold" grpId="0" nodeType="withEffect">
-                                  <p:stCondLst>
-                                    <p:cond delay="2000"/>
-                                  </p:stCondLst>
-                                  <p:childTnLst>
-                                    <p:set>
-                                      <p:cBhvr>
-                                        <p:cTn id="12" dur="1" fill="hold">
-                                          <p:stCondLst>
-                                            <p:cond delay="0"/>
-                                          </p:stCondLst>
-                                        </p:cTn>
-                                        <p:tgtEl>
-                                          <p:spTgt spid="3">
-                                            <p:txEl>
-                                              <p:pRg st="1" end="1"/>
-                                            </p:txEl>
-                                          </p:spTgt>
-                                        </p:tgtEl>
-                                        <p:attrNameLst>
-                                          <p:attrName>style.visibility</p:attrName>
-                                        </p:attrNameLst>
-                                      </p:cBhvr>
-                                      <p:to>
-                                        <p:strVal val="visible"/>
-                                      </p:to>
-                                    </p:set>
-                                    <p:animEffect transition="in" filter="fade">
-                                      <p:cBhvr>
-                                        <p:cTn id="13" dur="500"/>
-                                        <p:tgtEl>
-                                          <p:spTgt spid="3">
-                                            <p:txEl>
-                                              <p:pRg st="1" end="1"/>
-                                            </p:txEl>
-                                          </p:spTgt>
-                                        </p:tgtEl>
-                                      </p:cBhvr>
-                                    </p:animEffect>
-                                  </p:childTnLst>
-                                </p:cTn>
-                              </p:par>
-                              <p:par>
-                                <p:cTn id="14" presetID="10" presetClass="entr" presetSubtype="0" fill="hold" grpId="0" nodeType="withEffect">
-                                  <p:stCondLst>
-                                    <p:cond delay="2000"/>
-                                  </p:stCondLst>
-                                  <p:childTnLst>
-                                    <p:set>
-                                      <p:cBhvr>
-                                        <p:cTn id="15" dur="1" fill="hold">
-                                          <p:stCondLst>
-                                            <p:cond delay="0"/>
-                                          </p:stCondLst>
-                                        </p:cTn>
-                                        <p:tgtEl>
-                                          <p:spTgt spid="3">
-                                            <p:txEl>
-                                              <p:pRg st="2" end="2"/>
-                                            </p:txEl>
-                                          </p:spTgt>
-                                        </p:tgtEl>
-                                        <p:attrNameLst>
-                                          <p:attrName>style.visibility</p:attrName>
-                                        </p:attrNameLst>
-                                      </p:cBhvr>
-                                      <p:to>
-                                        <p:strVal val="visible"/>
-                                      </p:to>
-                                    </p:set>
-                                    <p:animEffect transition="in" filter="fade">
-                                      <p:cBhvr>
-                                        <p:cTn id="16" dur="500"/>
-                                        <p:tgtEl>
-                                          <p:spTgt spid="3">
-                                            <p:txEl>
-                                              <p:pRg st="2" end="2"/>
-                                            </p:txEl>
-                                          </p:spTgt>
+                                          <p:spTgt spid="10"/>
                                         </p:tgtEl>
                                       </p:cBhvr>
                                     </p:animEffect>
@@ -5499,20 +5709,20 @@
       </p:par>
     </p:tnLst>
     <p:bldLst>
-      <p:bldP spid="2" grpId="0"/>
-      <p:bldP spid="3" grpId="0" uiExpand="1" build="p"/>
+      <p:bldP spid="5" grpId="0"/>
+      <p:bldP spid="10" grpId="0"/>
     </p:bldLst>
   </p:timing>
 </p:sld>
 </file>
 
-<file path=ppt/slides/slide2.xml><?xml version="1.0" encoding="utf-8"?>
+<file path=ppt/slides/slide3.xml><?xml version="1.0" encoding="utf-8"?>
 <p:sld xmlns:a="http://schemas.openxmlformats.org/drawingml/2006/main" xmlns:r="http://schemas.openxmlformats.org/officeDocument/2006/relationships" xmlns:p="http://schemas.openxmlformats.org/presentationml/2006/main">
   <p:cSld>
     <p:bg>
       <p:bgPr>
         <a:solidFill>
-          <a:schemeClr val="bg1"/>
+          <a:srgbClr val="000000"/>
         </a:solidFill>
         <a:effectLst/>
       </p:bgPr>
@@ -5531,12 +5741,12 @@
           <a:chExt cx="0" cy="0"/>
         </a:xfrm>
       </p:grpSpPr>
-      <p:sp useBgFill="1">
-        <p:nvSpPr>
-          <p:cNvPr id="12" name="Rectangle 11">
-            <a:extLst>
-              <a:ext uri="{FF2B5EF4-FFF2-40B4-BE49-F238E27FC236}">
-                <a16:creationId xmlns:a16="http://schemas.microsoft.com/office/drawing/2014/main" id="{53B021B3-DE93-4AB7-8A18-CF5F1CED88B8}"/>
+      <p:sp>
+        <p:nvSpPr>
+          <p:cNvPr id="1051" name="Rectangle 1050">
+            <a:extLst>
+              <a:ext uri="{FF2B5EF4-FFF2-40B4-BE49-F238E27FC236}">
+                <a16:creationId xmlns:a16="http://schemas.microsoft.com/office/drawing/2014/main" id="{71B2258F-86CA-4D4D-8270-BC05FCDEBFB3}"/>
               </a:ext>
               <a:ext uri="{C183D7F6-B498-43B3-948B-1728B52AA6E4}">
                 <adec:decorative xmlns:adec="http://schemas.microsoft.com/office/drawing/2017/decorative" val="1"/>
@@ -5557,203 +5767,13 @@
         <p:spPr>
           <a:xfrm>
             <a:off x="0" y="0"/>
-            <a:ext cx="12192000" cy="6858000"/>
-          </a:xfrm>
-          <a:prstGeom prst="rect">
-            <a:avLst/>
-          </a:prstGeom>
-          <a:ln>
-            <a:noFill/>
-          </a:ln>
-        </p:spPr>
-        <p:style>
-          <a:lnRef idx="2">
-            <a:schemeClr val="accent1">
-              <a:shade val="50000"/>
-            </a:schemeClr>
-          </a:lnRef>
-          <a:fillRef idx="1">
-            <a:schemeClr val="accent1"/>
-          </a:fillRef>
-          <a:effectRef idx="0">
-            <a:schemeClr val="accent1"/>
-          </a:effectRef>
-          <a:fontRef idx="minor">
-            <a:schemeClr val="lt1"/>
-          </a:fontRef>
-        </p:style>
-        <p:txBody>
-          <a:bodyPr rtlCol="0" anchor="ctr"/>
-          <a:lstStyle/>
-          <a:p>
-            <a:pPr algn="ctr"/>
-            <a:endParaRPr lang="en-US"/>
-          </a:p>
-        </p:txBody>
-      </p:sp>
-      <p:sp>
-        <p:nvSpPr>
-          <p:cNvPr id="3" name="Заголовок 2">
-            <a:extLst>
-              <a:ext uri="{FF2B5EF4-FFF2-40B4-BE49-F238E27FC236}">
-                <a16:creationId xmlns:a16="http://schemas.microsoft.com/office/drawing/2014/main" id="{1F7A4DF1-3181-E828-F7E8-BEF34A468223}"/>
-              </a:ext>
-            </a:extLst>
-          </p:cNvPr>
-          <p:cNvSpPr>
-            <a:spLocks noGrp="1"/>
-          </p:cNvSpPr>
-          <p:nvPr>
-            <p:ph type="title"/>
-          </p:nvPr>
-        </p:nvSpPr>
-        <p:spPr>
-          <a:xfrm>
-            <a:off x="841247" y="256032"/>
-            <a:ext cx="2685724" cy="1014984"/>
-          </a:xfrm>
-        </p:spPr>
-        <p:txBody>
-          <a:bodyPr vert="horz" lIns="91440" tIns="45720" rIns="91440" bIns="45720" rtlCol="0" anchor="b">
-            <a:normAutofit fontScale="90000"/>
-          </a:bodyPr>
-          <a:lstStyle/>
-          <a:p>
-            <a:r>
-              <a:rPr lang="en-US" sz="4400" kern="1200" dirty="0" err="1">
-                <a:solidFill>
-                  <a:schemeClr val="tx1"/>
-                </a:solidFill>
-                <a:latin typeface="+mj-lt"/>
-                <a:ea typeface="+mj-ea"/>
-                <a:cs typeface="+mj-cs"/>
-              </a:rPr>
-              <a:t>Идея</a:t>
-            </a:r>
-            <a:r>
-              <a:rPr lang="ru-RU" sz="4400" kern="1200" dirty="0">
-                <a:solidFill>
-                  <a:schemeClr val="tx1"/>
-                </a:solidFill>
-                <a:latin typeface="+mj-lt"/>
-                <a:ea typeface="+mj-ea"/>
-                <a:cs typeface="+mj-cs"/>
-              </a:rPr>
-              <a:t> создания</a:t>
-            </a:r>
-            <a:endParaRPr lang="en-US" sz="4400" kern="1200" dirty="0">
-              <a:solidFill>
-                <a:schemeClr val="tx1"/>
-              </a:solidFill>
-              <a:latin typeface="+mj-lt"/>
-              <a:ea typeface="+mj-ea"/>
-              <a:cs typeface="+mj-cs"/>
-            </a:endParaRPr>
-          </a:p>
-        </p:txBody>
-      </p:sp>
-      <p:sp>
-        <p:nvSpPr>
-          <p:cNvPr id="14" name="Rectangle 13">
-            <a:extLst>
-              <a:ext uri="{FF2B5EF4-FFF2-40B4-BE49-F238E27FC236}">
-                <a16:creationId xmlns:a16="http://schemas.microsoft.com/office/drawing/2014/main" id="{52D502E5-F6B4-4D58-B4AE-FC466FF15EE8}"/>
-              </a:ext>
-              <a:ext uri="{C183D7F6-B498-43B3-948B-1728B52AA6E4}">
-                <adec:decorative xmlns:adec="http://schemas.microsoft.com/office/drawing/2017/decorative" val="1"/>
-              </a:ext>
-            </a:extLst>
-          </p:cNvPr>
-          <p:cNvSpPr>
-            <a:spLocks noGrp="1" noRot="1" noChangeAspect="1" noMove="1" noResize="1" noEditPoints="1" noAdjustHandles="1" noChangeArrowheads="1" noChangeShapeType="1" noTextEdit="1"/>
-          </p:cNvSpPr>
-          <p:nvPr>
-            <p:extLst>
-              <p:ext uri="{386F3935-93C4-4BCD-93E2-E3B085C9AB24}">
-                <p16:designElem xmlns:p16="http://schemas.microsoft.com/office/powerpoint/2015/main" val="1"/>
-              </p:ext>
-            </p:extLst>
-          </p:nvPr>
-        </p:nvSpPr>
-        <p:spPr>
-          <a:xfrm>
-            <a:off x="865953" y="1634502"/>
-            <a:ext cx="10451592" cy="18288"/>
+            <a:ext cx="12192000" cy="6857999"/>
           </a:xfrm>
           <a:prstGeom prst="rect">
             <a:avLst/>
           </a:prstGeom>
           <a:solidFill>
-            <a:srgbClr val="D5D5D5"/>
-          </a:solidFill>
-          <a:ln w="3175">
-            <a:noFill/>
-          </a:ln>
-          <a:effectLst/>
-        </p:spPr>
-        <p:style>
-          <a:lnRef idx="2">
-            <a:schemeClr val="accent1">
-              <a:shade val="50000"/>
-            </a:schemeClr>
-          </a:lnRef>
-          <a:fillRef idx="1">
-            <a:schemeClr val="accent1"/>
-          </a:fillRef>
-          <a:effectRef idx="0">
-            <a:schemeClr val="accent1"/>
-          </a:effectRef>
-          <a:fontRef idx="minor">
-            <a:schemeClr val="lt1"/>
-          </a:fontRef>
-        </p:style>
-        <p:txBody>
-          <a:bodyPr rtlCol="0" anchor="ctr"/>
-          <a:lstStyle/>
-          <a:p>
-            <a:pPr algn="ctr"/>
-            <a:endParaRPr lang="en-US">
-              <a:solidFill>
-                <a:prstClr val="white"/>
-              </a:solidFill>
-              <a:latin typeface="Calibri" panose="020F0502020204030204"/>
-            </a:endParaRPr>
-          </a:p>
-        </p:txBody>
-      </p:sp>
-      <p:sp>
-        <p:nvSpPr>
-          <p:cNvPr id="16" name="Rectangle 15">
-            <a:extLst>
-              <a:ext uri="{FF2B5EF4-FFF2-40B4-BE49-F238E27FC236}">
-                <a16:creationId xmlns:a16="http://schemas.microsoft.com/office/drawing/2014/main" id="{9DECDBF4-02B6-4BB4-B65B-B8107AD6A9E8}"/>
-              </a:ext>
-              <a:ext uri="{C183D7F6-B498-43B3-948B-1728B52AA6E4}">
-                <adec:decorative xmlns:adec="http://schemas.microsoft.com/office/drawing/2017/decorative" val="1"/>
-              </a:ext>
-            </a:extLst>
-          </p:cNvPr>
-          <p:cNvSpPr>
-            <a:spLocks noGrp="1" noRot="1" noChangeAspect="1" noMove="1" noResize="1" noEditPoints="1" noAdjustHandles="1" noChangeArrowheads="1" noChangeShapeType="1" noTextEdit="1"/>
-          </p:cNvSpPr>
-          <p:nvPr>
-            <p:extLst>
-              <p:ext uri="{386F3935-93C4-4BCD-93E2-E3B085C9AB24}">
-                <p16:designElem xmlns:p16="http://schemas.microsoft.com/office/powerpoint/2015/main" val="1"/>
-              </p:ext>
-            </p:extLst>
-          </p:nvPr>
-        </p:nvSpPr>
-        <p:spPr>
-          <a:xfrm flipV="1">
-            <a:off x="841248" y="1538176"/>
-            <a:ext cx="1873457" cy="109814"/>
-          </a:xfrm>
-          <a:prstGeom prst="rect">
-            <a:avLst/>
-          </a:prstGeom>
-          <a:solidFill>
-            <a:schemeClr val="accent2"/>
+            <a:srgbClr val="000000"/>
           </a:solidFill>
           <a:ln>
             <a:noFill/>
@@ -5780,21 +5800,368 @@
           <a:lstStyle/>
           <a:p>
             <a:pPr algn="ctr"/>
-            <a:endParaRPr lang="en-US">
+            <a:endParaRPr lang="en-US"/>
+          </a:p>
+        </p:txBody>
+      </p:sp>
+      <p:pic>
+        <p:nvPicPr>
+          <p:cNvPr id="7" name="Объект 6" descr="Изображение выглядит как графическая вставка, Графика, символ, мультфильм&#10;&#10;Автоматически созданное описание">
+            <a:extLst>
+              <a:ext uri="{FF2B5EF4-FFF2-40B4-BE49-F238E27FC236}">
+                <a16:creationId xmlns:a16="http://schemas.microsoft.com/office/drawing/2014/main" id="{F412A128-BE10-0DDC-C265-72E7893A86BF}"/>
+              </a:ext>
+            </a:extLst>
+          </p:cNvPr>
+          <p:cNvPicPr>
+            <a:picLocks noChangeAspect="1"/>
+          </p:cNvPicPr>
+          <p:nvPr/>
+        </p:nvPicPr>
+        <p:blipFill rotWithShape="1">
+          <a:blip r:embed="rId2">
+            <a:alphaModFix amt="50000"/>
+          </a:blip>
+          <a:srcRect t="32882" r="1" b="15791"/>
+          <a:stretch/>
+        </p:blipFill>
+        <p:spPr>
+          <a:xfrm>
+            <a:off x="20" y="1"/>
+            <a:ext cx="12191980" cy="6857999"/>
+          </a:xfrm>
+          <a:prstGeom prst="rect">
+            <a:avLst/>
+          </a:prstGeom>
+        </p:spPr>
+      </p:pic>
+      <p:sp>
+        <p:nvSpPr>
+          <p:cNvPr id="2" name="Заголовок 1">
+            <a:extLst>
+              <a:ext uri="{FF2B5EF4-FFF2-40B4-BE49-F238E27FC236}">
+                <a16:creationId xmlns:a16="http://schemas.microsoft.com/office/drawing/2014/main" id="{223514A8-92CA-6A2B-975C-BA0A76A3E57F}"/>
+              </a:ext>
+            </a:extLst>
+          </p:cNvPr>
+          <p:cNvSpPr>
+            <a:spLocks noGrp="1"/>
+          </p:cNvSpPr>
+          <p:nvPr>
+            <p:ph type="title"/>
+          </p:nvPr>
+        </p:nvSpPr>
+        <p:spPr>
+          <a:xfrm>
+            <a:off x="1524000" y="1122362"/>
+            <a:ext cx="9144000" cy="2900518"/>
+          </a:xfrm>
+        </p:spPr>
+        <p:txBody>
+          <a:bodyPr vert="horz" lIns="91440" tIns="45720" rIns="91440" bIns="45720" rtlCol="0" anchor="b">
+            <a:normAutofit/>
+          </a:bodyPr>
+          <a:lstStyle/>
+          <a:p>
+            <a:pPr algn="ctr"/>
+            <a:r>
+              <a:rPr lang="ru-RU" sz="6000" dirty="0">
+                <a:solidFill>
+                  <a:srgbClr val="FFFFFF"/>
+                </a:solidFill>
+              </a:rPr>
+              <a:t>Основные </a:t>
+            </a:r>
+            <a:r>
+              <a:rPr lang="ru-RU" sz="6000" dirty="0" err="1">
+                <a:solidFill>
+                  <a:srgbClr val="FFFFFF"/>
+                </a:solidFill>
+              </a:rPr>
+              <a:t>библеотеки</a:t>
+            </a:r>
+            <a:endParaRPr lang="en-US" sz="6000" dirty="0">
               <a:solidFill>
-                <a:prstClr val="white"/>
+                <a:srgbClr val="FFFFFF"/>
               </a:solidFill>
-              <a:latin typeface="Calibri" panose="020F0502020204030204"/>
             </a:endParaRPr>
           </a:p>
         </p:txBody>
       </p:sp>
-      <p:sp>
-        <p:nvSpPr>
-          <p:cNvPr id="4" name="TextBox 3">
-            <a:extLst>
-              <a:ext uri="{FF2B5EF4-FFF2-40B4-BE49-F238E27FC236}">
-                <a16:creationId xmlns:a16="http://schemas.microsoft.com/office/drawing/2014/main" id="{FD66C458-68BD-EF05-DA36-EFFB50932357}"/>
+    </p:spTree>
+    <p:extLst>
+      <p:ext uri="{BB962C8B-B14F-4D97-AF65-F5344CB8AC3E}">
+        <p14:creationId xmlns:p14="http://schemas.microsoft.com/office/powerpoint/2010/main" val="1712980117"/>
+      </p:ext>
+    </p:extLst>
+  </p:cSld>
+  <p:clrMapOvr>
+    <a:overrideClrMapping bg1="dk1" tx1="lt1" bg2="dk2" tx2="lt2" accent1="accent1" accent2="accent2" accent3="accent3" accent4="accent4" accent5="accent5" accent6="accent6" hlink="hlink" folHlink="folHlink"/>
+  </p:clrMapOvr>
+</p:sld>
+</file>
+
+<file path=ppt/slides/slide4.xml><?xml version="1.0" encoding="utf-8"?>
+<p:sld xmlns:a="http://schemas.openxmlformats.org/drawingml/2006/main" xmlns:r="http://schemas.openxmlformats.org/officeDocument/2006/relationships" xmlns:p="http://schemas.openxmlformats.org/presentationml/2006/main">
+  <p:cSld>
+    <p:bg>
+      <p:bgPr>
+        <a:solidFill>
+          <a:srgbClr val="000000"/>
+        </a:solidFill>
+        <a:effectLst/>
+      </p:bgPr>
+    </p:bg>
+    <p:spTree>
+      <p:nvGrpSpPr>
+        <p:cNvPr id="1" name=""/>
+        <p:cNvGrpSpPr/>
+        <p:nvPr/>
+      </p:nvGrpSpPr>
+      <p:grpSpPr>
+        <a:xfrm>
+          <a:off x="0" y="0"/>
+          <a:ext cx="0" cy="0"/>
+          <a:chOff x="0" y="0"/>
+          <a:chExt cx="0" cy="0"/>
+        </a:xfrm>
+      </p:grpSpPr>
+      <p:sp>
+        <p:nvSpPr>
+          <p:cNvPr id="2102" name="Rectangle 2097">
+            <a:extLst>
+              <a:ext uri="{FF2B5EF4-FFF2-40B4-BE49-F238E27FC236}">
+                <a16:creationId xmlns:a16="http://schemas.microsoft.com/office/drawing/2014/main" id="{71B2258F-86CA-4D4D-8270-BC05FCDEBFB3}"/>
+              </a:ext>
+              <a:ext uri="{C183D7F6-B498-43B3-948B-1728B52AA6E4}">
+                <adec:decorative xmlns:adec="http://schemas.microsoft.com/office/drawing/2017/decorative" val="1"/>
+              </a:ext>
+            </a:extLst>
+          </p:cNvPr>
+          <p:cNvSpPr>
+            <a:spLocks noGrp="1" noRot="1" noChangeAspect="1" noMove="1" noResize="1" noEditPoints="1" noAdjustHandles="1" noChangeArrowheads="1" noChangeShapeType="1" noTextEdit="1"/>
+          </p:cNvSpPr>
+          <p:nvPr>
+            <p:extLst>
+              <p:ext uri="{386F3935-93C4-4BCD-93E2-E3B085C9AB24}">
+                <p16:designElem xmlns:p16="http://schemas.microsoft.com/office/powerpoint/2015/main" val="1"/>
+              </p:ext>
+            </p:extLst>
+          </p:nvPr>
+        </p:nvSpPr>
+        <p:spPr>
+          <a:xfrm>
+            <a:off x="0" y="0"/>
+            <a:ext cx="12192000" cy="6857999"/>
+          </a:xfrm>
+          <a:prstGeom prst="rect">
+            <a:avLst/>
+          </a:prstGeom>
+          <a:solidFill>
+            <a:srgbClr val="000000"/>
+          </a:solidFill>
+          <a:ln>
+            <a:noFill/>
+          </a:ln>
+        </p:spPr>
+        <p:style>
+          <a:lnRef idx="2">
+            <a:schemeClr val="accent1">
+              <a:shade val="50000"/>
+            </a:schemeClr>
+          </a:lnRef>
+          <a:fillRef idx="1">
+            <a:schemeClr val="accent1"/>
+          </a:fillRef>
+          <a:effectRef idx="0">
+            <a:schemeClr val="accent1"/>
+          </a:effectRef>
+          <a:fontRef idx="minor">
+            <a:schemeClr val="lt1"/>
+          </a:fontRef>
+        </p:style>
+        <p:txBody>
+          <a:bodyPr rtlCol="0" anchor="ctr"/>
+          <a:lstStyle/>
+          <a:p>
+            <a:pPr algn="ctr"/>
+            <a:endParaRPr lang="en-US"/>
+          </a:p>
+        </p:txBody>
+      </p:sp>
+      <p:pic>
+        <p:nvPicPr>
+          <p:cNvPr id="2052" name="Picture 4" descr="Getting Started With PyGame For Kids in 2023">
+            <a:extLst>
+              <a:ext uri="{FF2B5EF4-FFF2-40B4-BE49-F238E27FC236}">
+                <a16:creationId xmlns:a16="http://schemas.microsoft.com/office/drawing/2014/main" id="{B68A7405-FDFC-0602-846C-BABF03F1EEEF}"/>
+              </a:ext>
+            </a:extLst>
+          </p:cNvPr>
+          <p:cNvPicPr>
+            <a:picLocks noChangeAspect="1" noChangeArrowheads="1"/>
+          </p:cNvPicPr>
+          <p:nvPr/>
+        </p:nvPicPr>
+        <p:blipFill rotWithShape="1">
+          <a:blip r:embed="rId2">
+            <a:alphaModFix amt="50000"/>
+            <a:extLst>
+              <a:ext uri="{28A0092B-C50C-407E-A947-70E740481C1C}">
+                <a14:useLocalDpi xmlns:a14="http://schemas.microsoft.com/office/drawing/2010/main" val="0"/>
+              </a:ext>
+            </a:extLst>
+          </a:blip>
+          <a:srcRect t="12351" b="3380"/>
+          <a:stretch/>
+        </p:blipFill>
+        <p:spPr bwMode="auto">
+          <a:xfrm>
+            <a:off x="20" y="21351"/>
+            <a:ext cx="12191980" cy="6857999"/>
+          </a:xfrm>
+          <a:prstGeom prst="rect">
+            <a:avLst/>
+          </a:prstGeom>
+          <a:noFill/>
+          <a:extLst>
+            <a:ext uri="{909E8E84-426E-40DD-AFC4-6F175D3DCCD1}">
+              <a14:hiddenFill xmlns:a14="http://schemas.microsoft.com/office/drawing/2010/main">
+                <a:solidFill>
+                  <a:srgbClr val="FFFFFF"/>
+                </a:solidFill>
+              </a14:hiddenFill>
+            </a:ext>
+          </a:extLst>
+        </p:spPr>
+      </p:pic>
+      <p:sp>
+        <p:nvSpPr>
+          <p:cNvPr id="3" name="Объект 2">
+            <a:extLst>
+              <a:ext uri="{FF2B5EF4-FFF2-40B4-BE49-F238E27FC236}">
+                <a16:creationId xmlns:a16="http://schemas.microsoft.com/office/drawing/2014/main" id="{EFEA674A-2720-8510-1FF6-6791BDF68420}"/>
+              </a:ext>
+            </a:extLst>
+          </p:cNvPr>
+          <p:cNvSpPr>
+            <a:spLocks noGrp="1"/>
+          </p:cNvSpPr>
+          <p:nvPr>
+            <p:ph sz="quarter" idx="10"/>
+          </p:nvPr>
+        </p:nvSpPr>
+        <p:spPr>
+          <a:xfrm>
+            <a:off x="1524000" y="4653926"/>
+            <a:ext cx="9144000" cy="1098395"/>
+          </a:xfrm>
+        </p:spPr>
+        <p:txBody>
+          <a:bodyPr vert="horz" lIns="91440" tIns="45720" rIns="91440" bIns="45720" rtlCol="0">
+            <a:normAutofit/>
+          </a:bodyPr>
+          <a:lstStyle/>
+          <a:p>
+            <a:pPr marL="0" indent="0" algn="ctr">
+              <a:buNone/>
+            </a:pPr>
+            <a:r>
+              <a:rPr lang="en-US" sz="2400" dirty="0">
+                <a:solidFill>
+                  <a:srgbClr val="FFFFFF"/>
+                </a:solidFill>
+              </a:rPr>
+              <a:t>PYGAME – </a:t>
+            </a:r>
+            <a:r>
+              <a:rPr lang="ru-RU" sz="2000" dirty="0"/>
+              <a:t>набор модулей (библиотек) языка программирования Python, предназначенный для написания компьютерных игр</a:t>
+            </a:r>
+            <a:endParaRPr lang="en-US" sz="2000" dirty="0">
+              <a:solidFill>
+                <a:srgbClr val="FFFFFF"/>
+              </a:solidFill>
+            </a:endParaRPr>
+          </a:p>
+        </p:txBody>
+      </p:sp>
+    </p:spTree>
+    <p:extLst>
+      <p:ext uri="{BB962C8B-B14F-4D97-AF65-F5344CB8AC3E}">
+        <p14:creationId xmlns:p14="http://schemas.microsoft.com/office/powerpoint/2010/main" val="2585472108"/>
+      </p:ext>
+    </p:extLst>
+  </p:cSld>
+  <p:clrMapOvr>
+    <a:overrideClrMapping bg1="dk1" tx1="lt1" bg2="dk2" tx2="lt2" accent1="accent1" accent2="accent2" accent3="accent3" accent4="accent4" accent5="accent5" accent6="accent6" hlink="hlink" folHlink="folHlink"/>
+  </p:clrMapOvr>
+</p:sld>
+</file>
+
+<file path=ppt/slides/slide5.xml><?xml version="1.0" encoding="utf-8"?>
+<p:sld xmlns:a="http://schemas.openxmlformats.org/drawingml/2006/main" xmlns:r="http://schemas.openxmlformats.org/officeDocument/2006/relationships" xmlns:p="http://schemas.openxmlformats.org/presentationml/2006/main" showMasterSp="0">
+  <p:cSld>
+    <p:bg>
+      <p:bgPr>
+        <a:solidFill>
+          <a:schemeClr val="tx1">
+            <a:lumMod val="50000"/>
+            <a:lumOff val="50000"/>
+          </a:schemeClr>
+        </a:solidFill>
+        <a:effectLst/>
+      </p:bgPr>
+    </p:bg>
+    <p:spTree>
+      <p:nvGrpSpPr>
+        <p:cNvPr id="1" name=""/>
+        <p:cNvGrpSpPr/>
+        <p:nvPr/>
+      </p:nvGrpSpPr>
+      <p:grpSpPr>
+        <a:xfrm>
+          <a:off x="0" y="0"/>
+          <a:ext cx="0" cy="0"/>
+          <a:chOff x="0" y="0"/>
+          <a:chExt cx="0" cy="0"/>
+        </a:xfrm>
+      </p:grpSpPr>
+      <p:pic>
+        <p:nvPicPr>
+          <p:cNvPr id="5" name="Объект 4" descr="Изображение выглядит как текст, фантастика, снимок экрана, Компьютерная игра&#10;&#10;Автоматически созданное описание">
+            <a:extLst>
+              <a:ext uri="{FF2B5EF4-FFF2-40B4-BE49-F238E27FC236}">
+                <a16:creationId xmlns:a16="http://schemas.microsoft.com/office/drawing/2014/main" id="{57995619-E02E-B55E-5484-E066EA22A0D7}"/>
+              </a:ext>
+            </a:extLst>
+          </p:cNvPr>
+          <p:cNvPicPr>
+            <a:picLocks noGrp="1" noChangeAspect="1"/>
+          </p:cNvPicPr>
+          <p:nvPr>
+            <p:ph sz="quarter" idx="10"/>
+          </p:nvPr>
+        </p:nvPicPr>
+        <p:blipFill>
+          <a:blip r:embed="rId2"/>
+          <a:stretch>
+            <a:fillRect/>
+          </a:stretch>
+        </p:blipFill>
+        <p:spPr>
+          <a:xfrm>
+            <a:off x="594341" y="1468930"/>
+            <a:ext cx="4635489" cy="4813999"/>
+          </a:xfrm>
+        </p:spPr>
+      </p:pic>
+      <p:sp>
+        <p:nvSpPr>
+          <p:cNvPr id="6" name="TextBox 5">
+            <a:extLst>
+              <a:ext uri="{FF2B5EF4-FFF2-40B4-BE49-F238E27FC236}">
+                <a16:creationId xmlns:a16="http://schemas.microsoft.com/office/drawing/2014/main" id="{F38EBF76-931D-7206-0695-42281DAEDC6A}"/>
               </a:ext>
             </a:extLst>
           </p:cNvPr>
@@ -5803,8 +6170,8 @@
         </p:nvSpPr>
         <p:spPr>
           <a:xfrm>
-            <a:off x="315045" y="3501563"/>
-            <a:ext cx="3725110" cy="1047979"/>
+            <a:off x="594341" y="649716"/>
+            <a:ext cx="4865615" cy="646331"/>
           </a:xfrm>
           <a:prstGeom prst="rect">
             <a:avLst/>
@@ -5817,76 +6184,23 @@
           </a:bodyPr>
           <a:lstStyle/>
           <a:p>
-            <a:pPr defTabSz="1051560">
-              <a:spcAft>
-                <a:spcPts val="600"/>
-              </a:spcAft>
-            </a:pPr>
-            <a:r>
-              <a:rPr lang="ru-RU" sz="2070" kern="1200" dirty="0">
+            <a:r>
+              <a:rPr lang="ru-RU" sz="3600" dirty="0">
                 <a:solidFill>
-                  <a:srgbClr val="000000"/>
+                  <a:schemeClr val="bg1"/>
                 </a:solidFill>
-                <a:latin typeface="Times New Roman" panose="02020603050405020304" pitchFamily="18" charset="0"/>
-                <a:ea typeface="+mn-ea"/>
-                <a:cs typeface="+mn-cs"/>
               </a:rPr>
-              <a:t>Идея: создать пиксельную </a:t>
-            </a:r>
-            <a:r>
-              <a:rPr lang="ru-RU" sz="2070" kern="1200" dirty="0" err="1">
-                <a:solidFill>
-                  <a:srgbClr val="000000"/>
-                </a:solidFill>
-                <a:latin typeface="Times New Roman" panose="02020603050405020304" pitchFamily="18" charset="0"/>
-                <a:ea typeface="+mn-ea"/>
-                <a:cs typeface="+mn-cs"/>
-              </a:rPr>
-              <a:t>roguelike</a:t>
-            </a:r>
-            <a:r>
-              <a:rPr lang="ru-RU" sz="2070" kern="1200" dirty="0">
-                <a:solidFill>
-                  <a:srgbClr val="000000"/>
-                </a:solidFill>
-                <a:latin typeface="Times New Roman" panose="02020603050405020304" pitchFamily="18" charset="0"/>
-                <a:ea typeface="+mn-ea"/>
-                <a:cs typeface="+mn-cs"/>
-              </a:rPr>
-              <a:t>-RPG в стиле игры ''</a:t>
-            </a:r>
-            <a:r>
-              <a:rPr lang="ru-RU" sz="2070" kern="1200" dirty="0" err="1">
-                <a:solidFill>
-                  <a:srgbClr val="000000"/>
-                </a:solidFill>
-                <a:latin typeface="Times New Roman" panose="02020603050405020304" pitchFamily="18" charset="0"/>
-                <a:ea typeface="+mn-ea"/>
-                <a:cs typeface="+mn-cs"/>
-              </a:rPr>
-              <a:t>Soul</a:t>
-            </a:r>
-            <a:r>
-              <a:rPr lang="ru-RU" sz="2070" kern="1200" dirty="0">
-                <a:solidFill>
-                  <a:srgbClr val="000000"/>
-                </a:solidFill>
-                <a:latin typeface="Times New Roman" panose="02020603050405020304" pitchFamily="18" charset="0"/>
-                <a:ea typeface="+mn-ea"/>
-                <a:cs typeface="+mn-cs"/>
-              </a:rPr>
-              <a:t> Knight''</a:t>
-            </a:r>
-            <a:endParaRPr lang="ru-RU" dirty="0"/>
+              <a:t>Реализованы меню</a:t>
+            </a:r>
           </a:p>
         </p:txBody>
       </p:sp>
       <p:pic>
         <p:nvPicPr>
-          <p:cNvPr id="13" name="Рисунок 12" descr="Изображение выглядит как мультфильм, свет, искусство">
-            <a:extLst>
-              <a:ext uri="{FF2B5EF4-FFF2-40B4-BE49-F238E27FC236}">
-                <a16:creationId xmlns:a16="http://schemas.microsoft.com/office/drawing/2014/main" id="{5AB4C9DB-249A-1B1A-86A7-D2F866D65730}"/>
+          <p:cNvPr id="9" name="Рисунок 8" descr="Изображение выглядит как текст, фантастика, Компьютерная игра, снимок экрана&#10;&#10;Автоматически созданное описание">
+            <a:extLst>
+              <a:ext uri="{FF2B5EF4-FFF2-40B4-BE49-F238E27FC236}">
+                <a16:creationId xmlns:a16="http://schemas.microsoft.com/office/drawing/2014/main" id="{121000A8-5EF3-DABC-D9C4-83D3E4C6240D}"/>
               </a:ext>
             </a:extLst>
           </p:cNvPr>
@@ -5903,8 +6217,8 @@
         </p:blipFill>
         <p:spPr>
           <a:xfrm>
-            <a:off x="4355200" y="2294246"/>
-            <a:ext cx="3462612" cy="3462612"/>
+            <a:off x="6096000" y="1509066"/>
+            <a:ext cx="4635490" cy="4773863"/>
           </a:xfrm>
           <a:prstGeom prst="rect">
             <a:avLst/>
@@ -5914,21 +6228,96 @@
     </p:spTree>
     <p:extLst>
       <p:ext uri="{BB962C8B-B14F-4D97-AF65-F5344CB8AC3E}">
-        <p14:creationId xmlns:p14="http://schemas.microsoft.com/office/powerpoint/2010/main" val="3457616166"/>
+        <p14:creationId xmlns:p14="http://schemas.microsoft.com/office/powerpoint/2010/main" val="3032122871"/>
       </p:ext>
     </p:extLst>
   </p:cSld>
   <p:clrMapOvr>
     <a:masterClrMapping/>
   </p:clrMapOvr>
-  <mc:AlternateContent xmlns:mc="http://schemas.openxmlformats.org/markup-compatibility/2006" xmlns:p14="http://schemas.microsoft.com/office/powerpoint/2010/main">
-    <mc:Choice Requires="p14">
-      <p:transition p14:dur="10"/>
-    </mc:Choice>
-    <mc:Fallback xmlns="">
-      <p:transition/>
-    </mc:Fallback>
-  </mc:AlternateContent>
+</p:sld>
+</file>
+
+<file path=ppt/slides/slide6.xml><?xml version="1.0" encoding="utf-8"?>
+<p:sld xmlns:a="http://schemas.openxmlformats.org/drawingml/2006/main" xmlns:r="http://schemas.openxmlformats.org/officeDocument/2006/relationships" xmlns:p="http://schemas.openxmlformats.org/presentationml/2006/main">
+  <p:cSld>
+    <p:spTree>
+      <p:nvGrpSpPr>
+        <p:cNvPr id="1" name=""/>
+        <p:cNvGrpSpPr/>
+        <p:nvPr/>
+      </p:nvGrpSpPr>
+      <p:grpSpPr>
+        <a:xfrm>
+          <a:off x="0" y="0"/>
+          <a:ext cx="0" cy="0"/>
+          <a:chOff x="0" y="0"/>
+          <a:chExt cx="0" cy="0"/>
+        </a:xfrm>
+      </p:grpSpPr>
+      <p:sp>
+        <p:nvSpPr>
+          <p:cNvPr id="2" name="Заголовок 1">
+            <a:extLst>
+              <a:ext uri="{FF2B5EF4-FFF2-40B4-BE49-F238E27FC236}">
+                <a16:creationId xmlns:a16="http://schemas.microsoft.com/office/drawing/2014/main" id="{C098F19B-805A-FAB0-FDB9-98B200434096}"/>
+              </a:ext>
+            </a:extLst>
+          </p:cNvPr>
+          <p:cNvSpPr>
+            <a:spLocks noGrp="1"/>
+          </p:cNvSpPr>
+          <p:nvPr>
+            <p:ph type="title"/>
+          </p:nvPr>
+        </p:nvSpPr>
+        <p:spPr/>
+        <p:txBody>
+          <a:bodyPr/>
+          <a:lstStyle/>
+          <a:p>
+            <a:r>
+              <a:rPr lang="ru-RU" dirty="0"/>
+              <a:t>Вывод</a:t>
+            </a:r>
+          </a:p>
+        </p:txBody>
+      </p:sp>
+      <p:sp>
+        <p:nvSpPr>
+          <p:cNvPr id="3" name="Объект 2">
+            <a:extLst>
+              <a:ext uri="{FF2B5EF4-FFF2-40B4-BE49-F238E27FC236}">
+                <a16:creationId xmlns:a16="http://schemas.microsoft.com/office/drawing/2014/main" id="{C5E96C2F-1C08-6598-C8B7-757FE11843D3}"/>
+              </a:ext>
+            </a:extLst>
+          </p:cNvPr>
+          <p:cNvSpPr>
+            <a:spLocks noGrp="1"/>
+          </p:cNvSpPr>
+          <p:nvPr>
+            <p:ph sz="quarter" idx="10"/>
+          </p:nvPr>
+        </p:nvSpPr>
+        <p:spPr/>
+        <p:txBody>
+          <a:bodyPr/>
+          <a:lstStyle/>
+          <a:p>
+            <a:endParaRPr lang="ru-RU"/>
+          </a:p>
+        </p:txBody>
+      </p:sp>
+    </p:spTree>
+    <p:extLst>
+      <p:ext uri="{BB962C8B-B14F-4D97-AF65-F5344CB8AC3E}">
+        <p14:creationId xmlns:p14="http://schemas.microsoft.com/office/powerpoint/2010/main" val="3845412708"/>
+      </p:ext>
+    </p:extLst>
+  </p:cSld>
+  <p:clrMapOvr>
+    <a:masterClrMapping/>
+  </p:clrMapOvr>
 </p:sld>
 </file>
 

</xml_diff>

<commit_message>
death skelet mp3, small changes
</commit_message>
<xml_diff>
--- a/presentation.pptx
+++ b/presentation.pptx
@@ -17,8 +17,8 @@
     <p:sldId id="278" r:id="rId5"/>
     <p:sldId id="273" r:id="rId6"/>
     <p:sldId id="276" r:id="rId7"/>
-    <p:sldId id="277" r:id="rId8"/>
-    <p:sldId id="274" r:id="rId9"/>
+    <p:sldId id="274" r:id="rId8"/>
+    <p:sldId id="277" r:id="rId9"/>
     <p:sldId id="275" r:id="rId10"/>
   </p:sldIdLst>
   <p:sldSz cx="12192000" cy="6858000"/>
@@ -133,8 +133,8 @@
             <p14:sldId id="278"/>
             <p14:sldId id="273"/>
             <p14:sldId id="276"/>
+            <p14:sldId id="274"/>
             <p14:sldId id="277"/>
-            <p14:sldId id="274"/>
             <p14:sldId id="275"/>
           </p14:sldIdLst>
         </p14:section>
@@ -254,7 +254,7 @@
             <a:pPr rtl="0"/>
             <a:fld id="{3EF2CABD-ADFB-4662-86FE-964DAD288E0E}" type="datetime1">
               <a:rPr lang="ru-RU" smtClean="0"/>
-              <a:t>20.01.2024</a:t>
+              <a:t>21.01.2024</a:t>
             </a:fld>
             <a:endParaRPr lang="ru-RU"/>
           </a:p>
@@ -424,7 +424,7 @@
             <a:fld id="{68B812D4-DBF0-450F-B19D-420CCD76CB60}" type="datetime1">
               <a:rPr lang="ru-RU" smtClean="0"/>
               <a:pPr/>
-              <a:t>20.01.2024</a:t>
+              <a:t>21.01.2024</a:t>
             </a:fld>
             <a:endParaRPr lang="ru-RU" dirty="0"/>
           </a:p>
@@ -1019,7 +1019,7 @@
             <a:pPr rtl="0"/>
             <a:fld id="{0E309820-F966-41D6-9A9E-F094402396DD}" type="datetime1">
               <a:rPr lang="ru-RU" noProof="0" smtClean="0"/>
-              <a:t>20.01.2024</a:t>
+              <a:t>21.01.2024</a:t>
             </a:fld>
             <a:endParaRPr lang="ru-RU" noProof="0" dirty="0"/>
           </a:p>
@@ -1222,7 +1222,7 @@
             <a:pPr rtl="0"/>
             <a:fld id="{0E309820-F966-41D6-9A9E-F094402396DD}" type="datetime1">
               <a:rPr lang="ru-RU" noProof="0" smtClean="0"/>
-              <a:t>20.01.2024</a:t>
+              <a:t>21.01.2024</a:t>
             </a:fld>
             <a:endParaRPr lang="ru-RU" noProof="0" dirty="0"/>
           </a:p>
@@ -1435,7 +1435,7 @@
             <a:pPr rtl="0"/>
             <a:fld id="{0E309820-F966-41D6-9A9E-F094402396DD}" type="datetime1">
               <a:rPr lang="ru-RU" noProof="0" smtClean="0"/>
-              <a:t>20.01.2024</a:t>
+              <a:t>21.01.2024</a:t>
             </a:fld>
             <a:endParaRPr lang="ru-RU" noProof="0" dirty="0"/>
           </a:p>
@@ -1950,7 +1950,7 @@
             <a:pPr rtl="0"/>
             <a:fld id="{94BFA7FF-3CFD-4CAD-BB9E-67BC1F4C890D}" type="datetime1">
               <a:rPr lang="ru-RU" noProof="0" smtClean="0"/>
-              <a:t>20.01.2024</a:t>
+              <a:t>21.01.2024</a:t>
             </a:fld>
             <a:endParaRPr lang="ru-RU" noProof="0"/>
           </a:p>
@@ -2178,7 +2178,7 @@
             <a:pPr rtl="0"/>
             <a:fld id="{0E309820-F966-41D6-9A9E-F094402396DD}" type="datetime1">
               <a:rPr lang="ru-RU" noProof="0" smtClean="0"/>
-              <a:t>20.01.2024</a:t>
+              <a:t>21.01.2024</a:t>
             </a:fld>
             <a:endParaRPr lang="ru-RU" noProof="0" dirty="0"/>
           </a:p>
@@ -2458,7 +2458,7 @@
             <a:pPr rtl="0"/>
             <a:fld id="{0E309820-F966-41D6-9A9E-F094402396DD}" type="datetime1">
               <a:rPr lang="ru-RU" noProof="0" smtClean="0"/>
-              <a:t>20.01.2024</a:t>
+              <a:t>21.01.2024</a:t>
             </a:fld>
             <a:endParaRPr lang="ru-RU" noProof="0" dirty="0"/>
           </a:p>
@@ -2728,7 +2728,7 @@
             <a:pPr rtl="0"/>
             <a:fld id="{0E309820-F966-41D6-9A9E-F094402396DD}" type="datetime1">
               <a:rPr lang="ru-RU" noProof="0" smtClean="0"/>
-              <a:t>20.01.2024</a:t>
+              <a:t>21.01.2024</a:t>
             </a:fld>
             <a:endParaRPr lang="ru-RU" noProof="0" dirty="0"/>
           </a:p>
@@ -3145,7 +3145,7 @@
             <a:pPr rtl="0"/>
             <a:fld id="{0E309820-F966-41D6-9A9E-F094402396DD}" type="datetime1">
               <a:rPr lang="ru-RU" noProof="0" smtClean="0"/>
-              <a:t>20.01.2024</a:t>
+              <a:t>21.01.2024</a:t>
             </a:fld>
             <a:endParaRPr lang="ru-RU" noProof="0" dirty="0"/>
           </a:p>
@@ -3291,7 +3291,7 @@
             <a:pPr rtl="0"/>
             <a:fld id="{0E309820-F966-41D6-9A9E-F094402396DD}" type="datetime1">
               <a:rPr lang="ru-RU" noProof="0" smtClean="0"/>
-              <a:t>20.01.2024</a:t>
+              <a:t>21.01.2024</a:t>
             </a:fld>
             <a:endParaRPr lang="ru-RU" noProof="0" dirty="0"/>
           </a:p>
@@ -3409,7 +3409,7 @@
             <a:pPr rtl="0"/>
             <a:fld id="{0E309820-F966-41D6-9A9E-F094402396DD}" type="datetime1">
               <a:rPr lang="ru-RU" noProof="0" smtClean="0"/>
-              <a:t>20.01.2024</a:t>
+              <a:t>21.01.2024</a:t>
             </a:fld>
             <a:endParaRPr lang="ru-RU" noProof="0" dirty="0"/>
           </a:p>
@@ -3725,7 +3725,7 @@
             <a:pPr rtl="0"/>
             <a:fld id="{0E309820-F966-41D6-9A9E-F094402396DD}" type="datetime1">
               <a:rPr lang="ru-RU" noProof="0" smtClean="0"/>
-              <a:t>20.01.2024</a:t>
+              <a:t>21.01.2024</a:t>
             </a:fld>
             <a:endParaRPr lang="ru-RU" noProof="0" dirty="0"/>
           </a:p>
@@ -4018,7 +4018,7 @@
             <a:pPr rtl="0"/>
             <a:fld id="{0E309820-F966-41D6-9A9E-F094402396DD}" type="datetime1">
               <a:rPr lang="ru-RU" noProof="0" smtClean="0"/>
-              <a:t>20.01.2024</a:t>
+              <a:t>21.01.2024</a:t>
             </a:fld>
             <a:endParaRPr lang="ru-RU" noProof="0" dirty="0"/>
           </a:p>
@@ -4264,7 +4264,7 @@
             <a:pPr rtl="0"/>
             <a:fld id="{0E309820-F966-41D6-9A9E-F094402396DD}" type="datetime1">
               <a:rPr lang="ru-RU" noProof="0" smtClean="0"/>
-              <a:t>20.01.2024</a:t>
+              <a:t>21.01.2024</a:t>
             </a:fld>
             <a:endParaRPr lang="ru-RU" noProof="0" dirty="0"/>
           </a:p>
@@ -9603,86 +9603,6 @@
 </file>
 
 <file path=ppt/slides/slide7.xml><?xml version="1.0" encoding="utf-8"?>
-<p:sld xmlns:a="http://schemas.openxmlformats.org/drawingml/2006/main" xmlns:r="http://schemas.openxmlformats.org/officeDocument/2006/relationships" xmlns:p="http://schemas.openxmlformats.org/presentationml/2006/main">
-  <p:cSld>
-    <p:spTree>
-      <p:nvGrpSpPr>
-        <p:cNvPr id="1" name=""/>
-        <p:cNvGrpSpPr/>
-        <p:nvPr/>
-      </p:nvGrpSpPr>
-      <p:grpSpPr>
-        <a:xfrm>
-          <a:off x="0" y="0"/>
-          <a:ext cx="0" cy="0"/>
-          <a:chOff x="0" y="0"/>
-          <a:chExt cx="0" cy="0"/>
-        </a:xfrm>
-      </p:grpSpPr>
-      <p:sp>
-        <p:nvSpPr>
-          <p:cNvPr id="2" name="Заголовок 1">
-            <a:extLst>
-              <a:ext uri="{FF2B5EF4-FFF2-40B4-BE49-F238E27FC236}">
-                <a16:creationId xmlns:a16="http://schemas.microsoft.com/office/drawing/2014/main" id="{683392EF-A0B1-971E-6D02-3C03DF4D7670}"/>
-              </a:ext>
-            </a:extLst>
-          </p:cNvPr>
-          <p:cNvSpPr>
-            <a:spLocks noGrp="1"/>
-          </p:cNvSpPr>
-          <p:nvPr>
-            <p:ph type="title"/>
-          </p:nvPr>
-        </p:nvSpPr>
-        <p:spPr/>
-        <p:txBody>
-          <a:bodyPr/>
-          <a:lstStyle/>
-          <a:p>
-            <a:endParaRPr lang="ru-RU" dirty="0"/>
-          </a:p>
-        </p:txBody>
-      </p:sp>
-      <p:sp>
-        <p:nvSpPr>
-          <p:cNvPr id="3" name="Объект 2">
-            <a:extLst>
-              <a:ext uri="{FF2B5EF4-FFF2-40B4-BE49-F238E27FC236}">
-                <a16:creationId xmlns:a16="http://schemas.microsoft.com/office/drawing/2014/main" id="{C3C9C848-8DAF-7B16-F636-550109114732}"/>
-              </a:ext>
-            </a:extLst>
-          </p:cNvPr>
-          <p:cNvSpPr>
-            <a:spLocks noGrp="1"/>
-          </p:cNvSpPr>
-          <p:nvPr>
-            <p:ph sz="quarter" idx="10"/>
-          </p:nvPr>
-        </p:nvSpPr>
-        <p:spPr/>
-        <p:txBody>
-          <a:bodyPr/>
-          <a:lstStyle/>
-          <a:p>
-            <a:endParaRPr lang="ru-RU" dirty="0"/>
-          </a:p>
-        </p:txBody>
-      </p:sp>
-    </p:spTree>
-    <p:extLst>
-      <p:ext uri="{BB962C8B-B14F-4D97-AF65-F5344CB8AC3E}">
-        <p14:creationId xmlns:p14="http://schemas.microsoft.com/office/powerpoint/2010/main" val="4109042922"/>
-      </p:ext>
-    </p:extLst>
-  </p:cSld>
-  <p:clrMapOvr>
-    <a:masterClrMapping/>
-  </p:clrMapOvr>
-</p:sld>
-</file>
-
-<file path=ppt/slides/slide8.xml><?xml version="1.0" encoding="utf-8"?>
 <p:sld xmlns:a="http://schemas.openxmlformats.org/drawingml/2006/main" xmlns:r="http://schemas.openxmlformats.org/officeDocument/2006/relationships" xmlns:p="http://schemas.openxmlformats.org/presentationml/2006/main" showMasterSp="0">
   <p:cSld>
     <p:bg>
@@ -9780,10 +9700,10 @@
       </p:sp>
       <p:pic>
         <p:nvPicPr>
-          <p:cNvPr id="9" name="Рисунок 8" descr="Изображение выглядит как текст, фантастика, Компьютерная игра, снимок экрана&#10;&#10;Автоматически созданное описание">
+          <p:cNvPr id="3" name="Рисунок 2" descr="Изображение выглядит как пиксель, снимок экрана, текст, Программное обеспечение для видеоигр&#10;&#10;Автоматически созданное описание">
             <a:extLst>
               <a:ext uri="{FF2B5EF4-FFF2-40B4-BE49-F238E27FC236}">
-                <a16:creationId xmlns:a16="http://schemas.microsoft.com/office/drawing/2014/main" id="{121000A8-5EF3-DABC-D9C4-83D3E4C6240D}"/>
+                <a16:creationId xmlns:a16="http://schemas.microsoft.com/office/drawing/2014/main" id="{72EFC49E-3AFF-589E-E146-FE869DCEE5AE}"/>
               </a:ext>
             </a:extLst>
           </p:cNvPr>
@@ -9800,8 +9720,8 @@
         </p:blipFill>
         <p:spPr>
           <a:xfrm>
-            <a:off x="6096000" y="1509066"/>
-            <a:ext cx="4635490" cy="4773863"/>
+            <a:off x="6096000" y="1468930"/>
+            <a:ext cx="4635489" cy="4808886"/>
           </a:xfrm>
           <a:prstGeom prst="rect">
             <a:avLst/>
@@ -9812,6 +9732,73 @@
     <p:extLst>
       <p:ext uri="{BB962C8B-B14F-4D97-AF65-F5344CB8AC3E}">
         <p14:creationId xmlns:p14="http://schemas.microsoft.com/office/powerpoint/2010/main" val="3032122871"/>
+      </p:ext>
+    </p:extLst>
+  </p:cSld>
+  <p:clrMapOvr>
+    <a:masterClrMapping/>
+  </p:clrMapOvr>
+</p:sld>
+</file>
+
+<file path=ppt/slides/slide8.xml><?xml version="1.0" encoding="utf-8"?>
+<p:sld xmlns:a="http://schemas.openxmlformats.org/drawingml/2006/main" xmlns:r="http://schemas.openxmlformats.org/officeDocument/2006/relationships" xmlns:p="http://schemas.openxmlformats.org/presentationml/2006/main">
+  <p:cSld>
+    <p:bg>
+      <p:bgPr>
+        <a:solidFill>
+          <a:schemeClr val="bg1"/>
+        </a:solidFill>
+        <a:effectLst/>
+      </p:bgPr>
+    </p:bg>
+    <p:spTree>
+      <p:nvGrpSpPr>
+        <p:cNvPr id="1" name=""/>
+        <p:cNvGrpSpPr/>
+        <p:nvPr/>
+      </p:nvGrpSpPr>
+      <p:grpSpPr>
+        <a:xfrm>
+          <a:off x="0" y="0"/>
+          <a:ext cx="0" cy="0"/>
+          <a:chOff x="0" y="0"/>
+          <a:chExt cx="0" cy="0"/>
+        </a:xfrm>
+      </p:grpSpPr>
+      <p:pic>
+        <p:nvPicPr>
+          <p:cNvPr id="5" name="Объект 4" descr="Изображение выглядит как снимок экрана, прямоугольный, Мультимедийное программное обеспечение, Графическое программное обеспечение&#10;&#10;Автоматически созданное описание">
+            <a:extLst>
+              <a:ext uri="{FF2B5EF4-FFF2-40B4-BE49-F238E27FC236}">
+                <a16:creationId xmlns:a16="http://schemas.microsoft.com/office/drawing/2014/main" id="{59455B7C-2EB3-9ACF-BF3E-9722B87C044F}"/>
+              </a:ext>
+            </a:extLst>
+          </p:cNvPr>
+          <p:cNvPicPr>
+            <a:picLocks noChangeAspect="1"/>
+          </p:cNvPicPr>
+          <p:nvPr/>
+        </p:nvPicPr>
+        <p:blipFill rotWithShape="1">
+          <a:blip r:embed="rId2"/>
+          <a:srcRect r="7993"/>
+          <a:stretch/>
+        </p:blipFill>
+        <p:spPr>
+          <a:xfrm>
+            <a:off x="3622816" y="643466"/>
+            <a:ext cx="4946368" cy="5571067"/>
+          </a:xfrm>
+          <a:prstGeom prst="rect">
+            <a:avLst/>
+          </a:prstGeom>
+        </p:spPr>
+      </p:pic>
+    </p:spTree>
+    <p:extLst>
+      <p:ext uri="{BB962C8B-B14F-4D97-AF65-F5344CB8AC3E}">
+        <p14:creationId xmlns:p14="http://schemas.microsoft.com/office/powerpoint/2010/main" val="4109042922"/>
       </p:ext>
     </p:extLst>
   </p:cSld>
@@ -9861,7 +9848,7 @@
           <a:p>
             <a:r>
               <a:rPr lang="ru-RU" dirty="0"/>
-              <a:t>Вывод</a:t>
+              <a:t>Итоги</a:t>
             </a:r>
           </a:p>
         </p:txBody>
@@ -9884,10 +9871,48 @@
         </p:nvSpPr>
         <p:spPr/>
         <p:txBody>
-          <a:bodyPr/>
+          <a:bodyPr>
+            <a:normAutofit/>
+          </a:bodyPr>
           <a:lstStyle/>
           <a:p>
-            <a:endParaRPr lang="ru-RU"/>
+            <a:pPr marL="0" indent="0">
+              <a:buNone/>
+            </a:pPr>
+            <a:r>
+              <a:rPr lang="ru-RU" sz="1600" dirty="0"/>
+              <a:t>Улучшить</a:t>
+            </a:r>
+          </a:p>
+          <a:p>
+            <a:r>
+              <a:rPr lang="ru-RU" sz="1600" dirty="0"/>
+              <a:t>Добавление нового оружия</a:t>
+            </a:r>
+          </a:p>
+          <a:p>
+            <a:r>
+              <a:rPr lang="ru-RU" sz="1600" dirty="0"/>
+              <a:t>Большее количество уровней</a:t>
+            </a:r>
+          </a:p>
+          <a:p>
+            <a:r>
+              <a:rPr lang="ru-RU" sz="1600" dirty="0"/>
+              <a:t>Разнообразие врагов</a:t>
+            </a:r>
+          </a:p>
+          <a:p>
+            <a:r>
+              <a:rPr lang="ru-RU" sz="1600" dirty="0"/>
+              <a:t>Прокачка персонажа</a:t>
+            </a:r>
+          </a:p>
+          <a:p>
+            <a:pPr marL="0" indent="0">
+              <a:buNone/>
+            </a:pPr>
+            <a:endParaRPr lang="ru-RU" sz="1600" dirty="0"/>
           </a:p>
         </p:txBody>
       </p:sp>

</xml_diff>

<commit_message>
final, i think so
</commit_message>
<xml_diff>
--- a/presentation.pptx
+++ b/presentation.pptx
@@ -5,10 +5,10 @@
     <p:sldMasterId id="2147483684" r:id="rId1"/>
   </p:sldMasterIdLst>
   <p:notesMasterIdLst>
-    <p:notesMasterId r:id="rId11"/>
+    <p:notesMasterId r:id="rId12"/>
   </p:notesMasterIdLst>
   <p:handoutMasterIdLst>
-    <p:handoutMasterId r:id="rId12"/>
+    <p:handoutMasterId r:id="rId13"/>
   </p:handoutMasterIdLst>
   <p:sldIdLst>
     <p:sldId id="256" r:id="rId2"/>
@@ -16,10 +16,11 @@
     <p:sldId id="272" r:id="rId4"/>
     <p:sldId id="278" r:id="rId5"/>
     <p:sldId id="273" r:id="rId6"/>
-    <p:sldId id="276" r:id="rId7"/>
-    <p:sldId id="274" r:id="rId8"/>
-    <p:sldId id="277" r:id="rId9"/>
-    <p:sldId id="275" r:id="rId10"/>
+    <p:sldId id="279" r:id="rId7"/>
+    <p:sldId id="276" r:id="rId8"/>
+    <p:sldId id="274" r:id="rId9"/>
+    <p:sldId id="277" r:id="rId10"/>
+    <p:sldId id="275" r:id="rId11"/>
   </p:sldIdLst>
   <p:sldSz cx="12192000" cy="6858000"/>
   <p:notesSz cx="6858000" cy="9144000"/>
@@ -132,6 +133,7 @@
             <p14:sldId id="272"/>
             <p14:sldId id="278"/>
             <p14:sldId id="273"/>
+            <p14:sldId id="279"/>
             <p14:sldId id="276"/>
             <p14:sldId id="274"/>
             <p14:sldId id="277"/>
@@ -5316,6 +5318,513 @@
 </p:sld>
 </file>
 
+<file path=ppt/slides/slide10.xml><?xml version="1.0" encoding="utf-8"?>
+<p:sld xmlns:a="http://schemas.openxmlformats.org/drawingml/2006/main" xmlns:r="http://schemas.openxmlformats.org/officeDocument/2006/relationships" xmlns:p="http://schemas.openxmlformats.org/presentationml/2006/main" showMasterSp="0">
+  <p:cSld>
+    <p:bg>
+      <p:bgPr>
+        <a:solidFill>
+          <a:schemeClr val="bg2">
+            <a:lumMod val="90000"/>
+          </a:schemeClr>
+        </a:solidFill>
+        <a:effectLst/>
+      </p:bgPr>
+    </p:bg>
+    <p:spTree>
+      <p:nvGrpSpPr>
+        <p:cNvPr id="1" name=""/>
+        <p:cNvGrpSpPr/>
+        <p:nvPr/>
+      </p:nvGrpSpPr>
+      <p:grpSpPr>
+        <a:xfrm>
+          <a:off x="0" y="0"/>
+          <a:ext cx="0" cy="0"/>
+          <a:chOff x="0" y="0"/>
+          <a:chExt cx="0" cy="0"/>
+        </a:xfrm>
+      </p:grpSpPr>
+      <p:sp>
+        <p:nvSpPr>
+          <p:cNvPr id="5" name="Прямоугольник 4">
+            <a:extLst>
+              <a:ext uri="{FF2B5EF4-FFF2-40B4-BE49-F238E27FC236}">
+                <a16:creationId xmlns:a16="http://schemas.microsoft.com/office/drawing/2014/main" id="{9185203E-E82C-755E-727D-CC0D93A6EF62}"/>
+              </a:ext>
+            </a:extLst>
+          </p:cNvPr>
+          <p:cNvSpPr/>
+          <p:nvPr/>
+        </p:nvSpPr>
+        <p:spPr>
+          <a:xfrm>
+            <a:off x="528832" y="335560"/>
+            <a:ext cx="3481431" cy="847288"/>
+          </a:xfrm>
+          <a:prstGeom prst="rect">
+            <a:avLst/>
+          </a:prstGeom>
+        </p:spPr>
+        <p:style>
+          <a:lnRef idx="2">
+            <a:schemeClr val="accent3">
+              <a:shade val="15000"/>
+            </a:schemeClr>
+          </a:lnRef>
+          <a:fillRef idx="1">
+            <a:schemeClr val="accent3"/>
+          </a:fillRef>
+          <a:effectRef idx="0">
+            <a:schemeClr val="accent3"/>
+          </a:effectRef>
+          <a:fontRef idx="minor">
+            <a:schemeClr val="lt1"/>
+          </a:fontRef>
+        </p:style>
+        <p:txBody>
+          <a:bodyPr rtlCol="0" anchor="ctr"/>
+          <a:lstStyle/>
+          <a:p>
+            <a:pPr algn="ctr"/>
+            <a:endParaRPr lang="ru-RU">
+              <a:ln w="0"/>
+              <a:solidFill>
+                <a:schemeClr val="tx1"/>
+              </a:solidFill>
+              <a:effectLst>
+                <a:outerShdw blurRad="38100" dist="19050" dir="2700000" algn="tl" rotWithShape="0">
+                  <a:schemeClr val="dk1">
+                    <a:alpha val="40000"/>
+                  </a:schemeClr>
+                </a:outerShdw>
+              </a:effectLst>
+            </a:endParaRPr>
+          </a:p>
+        </p:txBody>
+      </p:sp>
+      <p:sp>
+        <p:nvSpPr>
+          <p:cNvPr id="2" name="Заголовок 1">
+            <a:extLst>
+              <a:ext uri="{FF2B5EF4-FFF2-40B4-BE49-F238E27FC236}">
+                <a16:creationId xmlns:a16="http://schemas.microsoft.com/office/drawing/2014/main" id="{C098F19B-805A-FAB0-FDB9-98B200434096}"/>
+              </a:ext>
+            </a:extLst>
+          </p:cNvPr>
+          <p:cNvSpPr>
+            <a:spLocks noGrp="1"/>
+          </p:cNvSpPr>
+          <p:nvPr>
+            <p:ph type="title"/>
+          </p:nvPr>
+        </p:nvSpPr>
+        <p:spPr>
+          <a:xfrm>
+            <a:off x="1124452" y="230697"/>
+            <a:ext cx="2013032" cy="1057013"/>
+          </a:xfrm>
+        </p:spPr>
+        <p:txBody>
+          <a:bodyPr>
+            <a:noAutofit/>
+          </a:bodyPr>
+          <a:lstStyle/>
+          <a:p>
+            <a:r>
+              <a:rPr lang="ru-RU" sz="6000" b="1" dirty="0"/>
+              <a:t>Итоги</a:t>
+            </a:r>
+          </a:p>
+        </p:txBody>
+      </p:sp>
+      <p:sp>
+        <p:nvSpPr>
+          <p:cNvPr id="3" name="Объект 2">
+            <a:extLst>
+              <a:ext uri="{FF2B5EF4-FFF2-40B4-BE49-F238E27FC236}">
+                <a16:creationId xmlns:a16="http://schemas.microsoft.com/office/drawing/2014/main" id="{C5E96C2F-1C08-6598-C8B7-757FE11843D3}"/>
+              </a:ext>
+            </a:extLst>
+          </p:cNvPr>
+          <p:cNvSpPr>
+            <a:spLocks noGrp="1"/>
+          </p:cNvSpPr>
+          <p:nvPr>
+            <p:ph sz="quarter" idx="10"/>
+          </p:nvPr>
+        </p:nvSpPr>
+        <p:spPr>
+          <a:xfrm>
+            <a:off x="528832" y="1676240"/>
+            <a:ext cx="4416552" cy="2618923"/>
+          </a:xfrm>
+        </p:spPr>
+        <p:txBody>
+          <a:bodyPr>
+            <a:normAutofit/>
+          </a:bodyPr>
+          <a:lstStyle/>
+          <a:p>
+            <a:pPr marL="0" indent="0">
+              <a:buNone/>
+            </a:pPr>
+            <a:r>
+              <a:rPr lang="ru-RU" sz="2400" dirty="0"/>
+              <a:t>Улучшить</a:t>
+            </a:r>
+          </a:p>
+          <a:p>
+            <a:r>
+              <a:rPr lang="ru-RU" sz="2000" dirty="0"/>
+              <a:t>Добавление нового оружия</a:t>
+            </a:r>
+          </a:p>
+          <a:p>
+            <a:r>
+              <a:rPr lang="ru-RU" sz="2000" dirty="0"/>
+              <a:t>Большее количество уровней</a:t>
+            </a:r>
+          </a:p>
+          <a:p>
+            <a:r>
+              <a:rPr lang="ru-RU" sz="2000" dirty="0"/>
+              <a:t>Разнообразие врагов</a:t>
+            </a:r>
+          </a:p>
+          <a:p>
+            <a:r>
+              <a:rPr lang="ru-RU" sz="2000" dirty="0"/>
+              <a:t>Прокачка персонажа</a:t>
+            </a:r>
+          </a:p>
+          <a:p>
+            <a:r>
+              <a:rPr lang="ru-RU" sz="2000" dirty="0"/>
+              <a:t>Сражение с боссом</a:t>
+            </a:r>
+          </a:p>
+        </p:txBody>
+      </p:sp>
+    </p:spTree>
+    <p:extLst>
+      <p:ext uri="{BB962C8B-B14F-4D97-AF65-F5344CB8AC3E}">
+        <p14:creationId xmlns:p14="http://schemas.microsoft.com/office/powerpoint/2010/main" val="3845412708"/>
+      </p:ext>
+    </p:extLst>
+  </p:cSld>
+  <p:clrMapOvr>
+    <a:masterClrMapping/>
+  </p:clrMapOvr>
+  <p:timing>
+    <p:tnLst>
+      <p:par>
+        <p:cTn id="1" dur="indefinite" restart="never" nodeType="tmRoot">
+          <p:childTnLst>
+            <p:seq concurrent="1" nextAc="seek">
+              <p:cTn id="2" dur="indefinite" nodeType="mainSeq">
+                <p:childTnLst>
+                  <p:par>
+                    <p:cTn id="3" fill="hold">
+                      <p:stCondLst>
+                        <p:cond delay="indefinite"/>
+                      </p:stCondLst>
+                      <p:childTnLst>
+                        <p:par>
+                          <p:cTn id="4" fill="hold">
+                            <p:stCondLst>
+                              <p:cond delay="0"/>
+                            </p:stCondLst>
+                            <p:childTnLst>
+                              <p:par>
+                                <p:cTn id="5" presetID="10" presetClass="entr" presetSubtype="0" fill="hold" nodeType="clickEffect">
+                                  <p:stCondLst>
+                                    <p:cond delay="0"/>
+                                  </p:stCondLst>
+                                  <p:childTnLst>
+                                    <p:set>
+                                      <p:cBhvr>
+                                        <p:cTn id="6" dur="1" fill="hold">
+                                          <p:stCondLst>
+                                            <p:cond delay="0"/>
+                                          </p:stCondLst>
+                                        </p:cTn>
+                                        <p:tgtEl>
+                                          <p:spTgt spid="3">
+                                            <p:txEl>
+                                              <p:pRg st="0" end="0"/>
+                                            </p:txEl>
+                                          </p:spTgt>
+                                        </p:tgtEl>
+                                        <p:attrNameLst>
+                                          <p:attrName>style.visibility</p:attrName>
+                                        </p:attrNameLst>
+                                      </p:cBhvr>
+                                      <p:to>
+                                        <p:strVal val="visible"/>
+                                      </p:to>
+                                    </p:set>
+                                    <p:animEffect transition="in" filter="fade">
+                                      <p:cBhvr>
+                                        <p:cTn id="7" dur="500"/>
+                                        <p:tgtEl>
+                                          <p:spTgt spid="3">
+                                            <p:txEl>
+                                              <p:pRg st="0" end="0"/>
+                                            </p:txEl>
+                                          </p:spTgt>
+                                        </p:tgtEl>
+                                      </p:cBhvr>
+                                    </p:animEffect>
+                                  </p:childTnLst>
+                                </p:cTn>
+                              </p:par>
+                              <p:par>
+                                <p:cTn id="8" presetID="10" presetClass="entr" presetSubtype="0" fill="hold" nodeType="withEffect">
+                                  <p:stCondLst>
+                                    <p:cond delay="0"/>
+                                  </p:stCondLst>
+                                  <p:childTnLst>
+                                    <p:set>
+                                      <p:cBhvr>
+                                        <p:cTn id="9" dur="1" fill="hold">
+                                          <p:stCondLst>
+                                            <p:cond delay="0"/>
+                                          </p:stCondLst>
+                                        </p:cTn>
+                                        <p:tgtEl>
+                                          <p:spTgt spid="3">
+                                            <p:txEl>
+                                              <p:pRg st="1" end="1"/>
+                                            </p:txEl>
+                                          </p:spTgt>
+                                        </p:tgtEl>
+                                        <p:attrNameLst>
+                                          <p:attrName>style.visibility</p:attrName>
+                                        </p:attrNameLst>
+                                      </p:cBhvr>
+                                      <p:to>
+                                        <p:strVal val="visible"/>
+                                      </p:to>
+                                    </p:set>
+                                    <p:animEffect transition="in" filter="fade">
+                                      <p:cBhvr>
+                                        <p:cTn id="10" dur="500"/>
+                                        <p:tgtEl>
+                                          <p:spTgt spid="3">
+                                            <p:txEl>
+                                              <p:pRg st="1" end="1"/>
+                                            </p:txEl>
+                                          </p:spTgt>
+                                        </p:tgtEl>
+                                      </p:cBhvr>
+                                    </p:animEffect>
+                                  </p:childTnLst>
+                                </p:cTn>
+                              </p:par>
+                              <p:par>
+                                <p:cTn id="11" presetID="10" presetClass="entr" presetSubtype="0" fill="hold" nodeType="withEffect">
+                                  <p:stCondLst>
+                                    <p:cond delay="0"/>
+                                  </p:stCondLst>
+                                  <p:childTnLst>
+                                    <p:set>
+                                      <p:cBhvr>
+                                        <p:cTn id="12" dur="1" fill="hold">
+                                          <p:stCondLst>
+                                            <p:cond delay="0"/>
+                                          </p:stCondLst>
+                                        </p:cTn>
+                                        <p:tgtEl>
+                                          <p:spTgt spid="3">
+                                            <p:txEl>
+                                              <p:pRg st="2" end="2"/>
+                                            </p:txEl>
+                                          </p:spTgt>
+                                        </p:tgtEl>
+                                        <p:attrNameLst>
+                                          <p:attrName>style.visibility</p:attrName>
+                                        </p:attrNameLst>
+                                      </p:cBhvr>
+                                      <p:to>
+                                        <p:strVal val="visible"/>
+                                      </p:to>
+                                    </p:set>
+                                    <p:animEffect transition="in" filter="fade">
+                                      <p:cBhvr>
+                                        <p:cTn id="13" dur="500"/>
+                                        <p:tgtEl>
+                                          <p:spTgt spid="3">
+                                            <p:txEl>
+                                              <p:pRg st="2" end="2"/>
+                                            </p:txEl>
+                                          </p:spTgt>
+                                        </p:tgtEl>
+                                      </p:cBhvr>
+                                    </p:animEffect>
+                                  </p:childTnLst>
+                                </p:cTn>
+                              </p:par>
+                              <p:par>
+                                <p:cTn id="14" presetID="10" presetClass="entr" presetSubtype="0" fill="hold" nodeType="withEffect">
+                                  <p:stCondLst>
+                                    <p:cond delay="0"/>
+                                  </p:stCondLst>
+                                  <p:childTnLst>
+                                    <p:set>
+                                      <p:cBhvr>
+                                        <p:cTn id="15" dur="1" fill="hold">
+                                          <p:stCondLst>
+                                            <p:cond delay="0"/>
+                                          </p:stCondLst>
+                                        </p:cTn>
+                                        <p:tgtEl>
+                                          <p:spTgt spid="3">
+                                            <p:txEl>
+                                              <p:pRg st="3" end="3"/>
+                                            </p:txEl>
+                                          </p:spTgt>
+                                        </p:tgtEl>
+                                        <p:attrNameLst>
+                                          <p:attrName>style.visibility</p:attrName>
+                                        </p:attrNameLst>
+                                      </p:cBhvr>
+                                      <p:to>
+                                        <p:strVal val="visible"/>
+                                      </p:to>
+                                    </p:set>
+                                    <p:animEffect transition="in" filter="fade">
+                                      <p:cBhvr>
+                                        <p:cTn id="16" dur="500"/>
+                                        <p:tgtEl>
+                                          <p:spTgt spid="3">
+                                            <p:txEl>
+                                              <p:pRg st="3" end="3"/>
+                                            </p:txEl>
+                                          </p:spTgt>
+                                        </p:tgtEl>
+                                      </p:cBhvr>
+                                    </p:animEffect>
+                                  </p:childTnLst>
+                                </p:cTn>
+                              </p:par>
+                              <p:par>
+                                <p:cTn id="17" presetID="10" presetClass="entr" presetSubtype="0" fill="hold" nodeType="withEffect">
+                                  <p:stCondLst>
+                                    <p:cond delay="0"/>
+                                  </p:stCondLst>
+                                  <p:childTnLst>
+                                    <p:set>
+                                      <p:cBhvr>
+                                        <p:cTn id="18" dur="1" fill="hold">
+                                          <p:stCondLst>
+                                            <p:cond delay="0"/>
+                                          </p:stCondLst>
+                                        </p:cTn>
+                                        <p:tgtEl>
+                                          <p:spTgt spid="3">
+                                            <p:txEl>
+                                              <p:pRg st="4" end="4"/>
+                                            </p:txEl>
+                                          </p:spTgt>
+                                        </p:tgtEl>
+                                        <p:attrNameLst>
+                                          <p:attrName>style.visibility</p:attrName>
+                                        </p:attrNameLst>
+                                      </p:cBhvr>
+                                      <p:to>
+                                        <p:strVal val="visible"/>
+                                      </p:to>
+                                    </p:set>
+                                    <p:animEffect transition="in" filter="fade">
+                                      <p:cBhvr>
+                                        <p:cTn id="19" dur="500"/>
+                                        <p:tgtEl>
+                                          <p:spTgt spid="3">
+                                            <p:txEl>
+                                              <p:pRg st="4" end="4"/>
+                                            </p:txEl>
+                                          </p:spTgt>
+                                        </p:tgtEl>
+                                      </p:cBhvr>
+                                    </p:animEffect>
+                                  </p:childTnLst>
+                                </p:cTn>
+                              </p:par>
+                              <p:par>
+                                <p:cTn id="20" presetID="10" presetClass="entr" presetSubtype="0" fill="hold" nodeType="withEffect">
+                                  <p:stCondLst>
+                                    <p:cond delay="0"/>
+                                  </p:stCondLst>
+                                  <p:childTnLst>
+                                    <p:set>
+                                      <p:cBhvr>
+                                        <p:cTn id="21" dur="1" fill="hold">
+                                          <p:stCondLst>
+                                            <p:cond delay="0"/>
+                                          </p:stCondLst>
+                                        </p:cTn>
+                                        <p:tgtEl>
+                                          <p:spTgt spid="3">
+                                            <p:txEl>
+                                              <p:pRg st="5" end="5"/>
+                                            </p:txEl>
+                                          </p:spTgt>
+                                        </p:tgtEl>
+                                        <p:attrNameLst>
+                                          <p:attrName>style.visibility</p:attrName>
+                                        </p:attrNameLst>
+                                      </p:cBhvr>
+                                      <p:to>
+                                        <p:strVal val="visible"/>
+                                      </p:to>
+                                    </p:set>
+                                    <p:animEffect transition="in" filter="fade">
+                                      <p:cBhvr>
+                                        <p:cTn id="22" dur="500"/>
+                                        <p:tgtEl>
+                                          <p:spTgt spid="3">
+                                            <p:txEl>
+                                              <p:pRg st="5" end="5"/>
+                                            </p:txEl>
+                                          </p:spTgt>
+                                        </p:tgtEl>
+                                      </p:cBhvr>
+                                    </p:animEffect>
+                                  </p:childTnLst>
+                                </p:cTn>
+                              </p:par>
+                            </p:childTnLst>
+                          </p:cTn>
+                        </p:par>
+                      </p:childTnLst>
+                    </p:cTn>
+                  </p:par>
+                </p:childTnLst>
+              </p:cTn>
+              <p:prevCondLst>
+                <p:cond evt="onPrev" delay="0">
+                  <p:tgtEl>
+                    <p:sldTgt/>
+                  </p:tgtEl>
+                </p:cond>
+              </p:prevCondLst>
+              <p:nextCondLst>
+                <p:cond evt="onNext" delay="0">
+                  <p:tgtEl>
+                    <p:sldTgt/>
+                  </p:tgtEl>
+                </p:cond>
+              </p:nextCondLst>
+            </p:seq>
+          </p:childTnLst>
+        </p:cTn>
+      </p:par>
+    </p:tnLst>
+  </p:timing>
+</p:sld>
+</file>
+
 <file path=ppt/slides/slide2.xml><?xml version="1.0" encoding="utf-8"?>
 <p:sld xmlns:a="http://schemas.openxmlformats.org/drawingml/2006/main" xmlns:r="http://schemas.openxmlformats.org/officeDocument/2006/relationships" xmlns:p="http://schemas.openxmlformats.org/presentationml/2006/main">
   <p:cSld>
@@ -5591,152 +6100,6 @@
       <p:transition/>
     </mc:Fallback>
   </mc:AlternateContent>
-  <p:timing>
-    <p:tnLst>
-      <p:par>
-        <p:cTn id="1" dur="indefinite" restart="never" nodeType="tmRoot">
-          <p:childTnLst>
-            <p:seq concurrent="1" nextAc="seek">
-              <p:cTn id="2" dur="indefinite" nodeType="mainSeq">
-                <p:childTnLst>
-                  <p:par>
-                    <p:cTn id="3" fill="hold">
-                      <p:stCondLst>
-                        <p:cond delay="indefinite"/>
-                        <p:cond evt="onBegin" delay="0">
-                          <p:tn val="2"/>
-                        </p:cond>
-                      </p:stCondLst>
-                      <p:childTnLst>
-                        <p:par>
-                          <p:cTn id="4" fill="hold">
-                            <p:stCondLst>
-                              <p:cond delay="0"/>
-                            </p:stCondLst>
-                            <p:childTnLst>
-                              <p:par>
-                                <p:cTn id="5" presetID="10" presetClass="entr" presetSubtype="0" fill="hold" grpId="0" nodeType="withEffect">
-                                  <p:stCondLst>
-                                    <p:cond delay="1000"/>
-                                  </p:stCondLst>
-                                  <p:iterate>
-                                    <p:tmPct val="10000"/>
-                                  </p:iterate>
-                                  <p:childTnLst>
-                                    <p:set>
-                                      <p:cBhvr>
-                                        <p:cTn id="6" dur="1" fill="hold">
-                                          <p:stCondLst>
-                                            <p:cond delay="0"/>
-                                          </p:stCondLst>
-                                        </p:cTn>
-                                        <p:tgtEl>
-                                          <p:spTgt spid="5"/>
-                                        </p:tgtEl>
-                                        <p:attrNameLst>
-                                          <p:attrName>style.visibility</p:attrName>
-                                        </p:attrNameLst>
-                                      </p:cBhvr>
-                                      <p:to>
-                                        <p:strVal val="visible"/>
-                                      </p:to>
-                                    </p:set>
-                                    <p:animEffect transition="in" filter="fade">
-                                      <p:cBhvr>
-                                        <p:cTn id="7" dur="700"/>
-                                        <p:tgtEl>
-                                          <p:spTgt spid="5"/>
-                                        </p:tgtEl>
-                                      </p:cBhvr>
-                                    </p:animEffect>
-                                  </p:childTnLst>
-                                </p:cTn>
-                              </p:par>
-                            </p:childTnLst>
-                          </p:cTn>
-                        </p:par>
-                      </p:childTnLst>
-                    </p:cTn>
-                  </p:par>
-                  <p:par>
-                    <p:cTn id="8" fill="hold">
-                      <p:stCondLst>
-                        <p:cond delay="indefinite"/>
-                      </p:stCondLst>
-                      <p:childTnLst>
-                        <p:par>
-                          <p:cTn id="9" fill="hold">
-                            <p:stCondLst>
-                              <p:cond delay="0"/>
-                            </p:stCondLst>
-                            <p:childTnLst>
-                              <p:par>
-                                <p:cTn id="10" presetID="10" presetClass="entr" presetSubtype="0" fill="hold" grpId="0" nodeType="clickEffect">
-                                  <p:stCondLst>
-                                    <p:cond delay="0"/>
-                                  </p:stCondLst>
-                                  <p:childTnLst>
-                                    <p:set>
-                                      <p:cBhvr>
-                                        <p:cTn id="11" dur="1" fill="hold">
-                                          <p:stCondLst>
-                                            <p:cond delay="0"/>
-                                          </p:stCondLst>
-                                        </p:cTn>
-                                        <p:tgtEl>
-                                          <p:spTgt spid="10"/>
-                                        </p:tgtEl>
-                                        <p:attrNameLst>
-                                          <p:attrName>style.visibility</p:attrName>
-                                        </p:attrNameLst>
-                                      </p:cBhvr>
-                                      <p:to>
-                                        <p:strVal val="visible"/>
-                                      </p:to>
-                                    </p:set>
-                                    <p:animEffect transition="in" filter="fade">
-                                      <p:cBhvr>
-                                        <p:cTn id="12" dur="500"/>
-                                        <p:tgtEl>
-                                          <p:spTgt spid="10"/>
-                                        </p:tgtEl>
-                                      </p:cBhvr>
-                                    </p:animEffect>
-                                  </p:childTnLst>
-                                </p:cTn>
-                              </p:par>
-                            </p:childTnLst>
-                          </p:cTn>
-                        </p:par>
-                      </p:childTnLst>
-                    </p:cTn>
-                  </p:par>
-                </p:childTnLst>
-              </p:cTn>
-              <p:prevCondLst>
-                <p:cond evt="onPrev" delay="0">
-                  <p:tgtEl>
-                    <p:sldTgt/>
-                  </p:tgtEl>
-                </p:cond>
-              </p:prevCondLst>
-              <p:nextCondLst>
-                <p:cond evt="onNext" delay="0">
-                  <p:tgtEl>
-                    <p:sldTgt/>
-                  </p:tgtEl>
-                </p:cond>
-              </p:nextCondLst>
-            </p:seq>
-          </p:childTnLst>
-        </p:cTn>
-      </p:par>
-    </p:tnLst>
-    <p:bldLst>
-      <p:bldP spid="5" grpId="0"/>
-      <p:bldP spid="10" grpId="0"/>
-    </p:bldLst>
-  </p:timing>
 </p:sld>
 </file>
 
@@ -5889,12 +6252,12 @@
           <a:p>
             <a:pPr algn="ctr"/>
             <a:r>
-              <a:rPr lang="ru-RU" sz="6000">
+              <a:rPr lang="ru-RU" sz="6000" dirty="0">
                 <a:solidFill>
                   <a:srgbClr val="FFFFFF"/>
                 </a:solidFill>
               </a:rPr>
-              <a:t>Реализация</a:t>
+              <a:t>Создание</a:t>
             </a:r>
             <a:endParaRPr lang="en-US" sz="6000" dirty="0">
               <a:solidFill>
@@ -6136,7 +6499,7 @@
           <a:lstStyle/>
           <a:p>
             <a:r>
-              <a:rPr lang="en-US" sz="1800">
+              <a:rPr lang="en-US" sz="1800" dirty="0">
                 <a:solidFill>
                   <a:schemeClr val="tx2"/>
                 </a:solidFill>
@@ -6146,40 +6509,28 @@
           </a:p>
           <a:p>
             <a:r>
-              <a:rPr lang="en-US" sz="1800">
+              <a:rPr lang="en-US" sz="1800" dirty="0" err="1">
                 <a:solidFill>
                   <a:schemeClr val="tx2"/>
                 </a:solidFill>
               </a:rPr>
               <a:t>Os</a:t>
             </a:r>
-          </a:p>
-          <a:p>
-            <a:r>
-              <a:rPr lang="en-US" sz="1800">
+            <a:endParaRPr lang="en-US" sz="1800" dirty="0">
+              <a:solidFill>
+                <a:schemeClr val="tx2"/>
+              </a:solidFill>
+            </a:endParaRPr>
+          </a:p>
+          <a:p>
+            <a:r>
+              <a:rPr lang="en-US" sz="1800" dirty="0">
                 <a:solidFill>
                   <a:schemeClr val="tx2"/>
                 </a:solidFill>
               </a:rPr>
               <a:t>Sys</a:t>
             </a:r>
-          </a:p>
-          <a:p>
-            <a:r>
-              <a:rPr lang="en-US" sz="1800">
-                <a:solidFill>
-                  <a:schemeClr val="tx2"/>
-                </a:solidFill>
-              </a:rPr>
-              <a:t>Random</a:t>
-            </a:r>
-          </a:p>
-          <a:p>
-            <a:endParaRPr lang="en-US" sz="1800" dirty="0">
-              <a:solidFill>
-                <a:schemeClr val="tx2"/>
-              </a:solidFill>
-            </a:endParaRPr>
           </a:p>
         </p:txBody>
       </p:sp>
@@ -9240,6 +9591,634 @@
           <a:chExt cx="0" cy="0"/>
         </a:xfrm>
       </p:grpSpPr>
+      <p:sp useBgFill="1">
+        <p:nvSpPr>
+          <p:cNvPr id="12" name="Rectangle 11">
+            <a:extLst>
+              <a:ext uri="{FF2B5EF4-FFF2-40B4-BE49-F238E27FC236}">
+                <a16:creationId xmlns:a16="http://schemas.microsoft.com/office/drawing/2014/main" id="{F13C74B1-5B17-4795-BED0-7140497B445A}"/>
+              </a:ext>
+              <a:ext uri="{C183D7F6-B498-43B3-948B-1728B52AA6E4}">
+                <adec:decorative xmlns:adec="http://schemas.microsoft.com/office/drawing/2017/decorative" val="1"/>
+              </a:ext>
+            </a:extLst>
+          </p:cNvPr>
+          <p:cNvSpPr>
+            <a:spLocks noGrp="1" noRot="1" noChangeAspect="1" noMove="1" noResize="1" noEditPoints="1" noAdjustHandles="1" noChangeArrowheads="1" noChangeShapeType="1" noTextEdit="1"/>
+          </p:cNvSpPr>
+          <p:nvPr>
+            <p:extLst>
+              <p:ext uri="{386F3935-93C4-4BCD-93E2-E3B085C9AB24}">
+                <p16:designElem xmlns:p16="http://schemas.microsoft.com/office/powerpoint/2015/main" val="1"/>
+              </p:ext>
+            </p:extLst>
+          </p:nvPr>
+        </p:nvSpPr>
+        <p:spPr>
+          <a:xfrm>
+            <a:off x="0" y="0"/>
+            <a:ext cx="12188952" cy="6858000"/>
+          </a:xfrm>
+          <a:prstGeom prst="rect">
+            <a:avLst/>
+          </a:prstGeom>
+          <a:ln>
+            <a:noFill/>
+          </a:ln>
+        </p:spPr>
+        <p:style>
+          <a:lnRef idx="2">
+            <a:schemeClr val="accent1">
+              <a:shade val="50000"/>
+            </a:schemeClr>
+          </a:lnRef>
+          <a:fillRef idx="1">
+            <a:schemeClr val="accent1"/>
+          </a:fillRef>
+          <a:effectRef idx="0">
+            <a:schemeClr val="accent1"/>
+          </a:effectRef>
+          <a:fontRef idx="minor">
+            <a:schemeClr val="lt1"/>
+          </a:fontRef>
+        </p:style>
+        <p:txBody>
+          <a:bodyPr rtlCol="0" anchor="ctr"/>
+          <a:lstStyle/>
+          <a:p>
+            <a:pPr algn="ctr"/>
+            <a:endParaRPr lang="en-US"/>
+          </a:p>
+        </p:txBody>
+      </p:sp>
+      <p:sp>
+        <p:nvSpPr>
+          <p:cNvPr id="2" name="Заголовок 1">
+            <a:extLst>
+              <a:ext uri="{FF2B5EF4-FFF2-40B4-BE49-F238E27FC236}">
+                <a16:creationId xmlns:a16="http://schemas.microsoft.com/office/drawing/2014/main" id="{D6A3BB11-81E7-E883-BD8C-B2AB296E7914}"/>
+              </a:ext>
+            </a:extLst>
+          </p:cNvPr>
+          <p:cNvSpPr>
+            <a:spLocks noGrp="1"/>
+          </p:cNvSpPr>
+          <p:nvPr>
+            <p:ph type="title"/>
+          </p:nvPr>
+        </p:nvSpPr>
+        <p:spPr>
+          <a:xfrm>
+            <a:off x="640080" y="325369"/>
+            <a:ext cx="4368602" cy="1956841"/>
+          </a:xfrm>
+        </p:spPr>
+        <p:txBody>
+          <a:bodyPr vert="horz" lIns="91440" tIns="45720" rIns="91440" bIns="45720" rtlCol="0" anchor="b">
+            <a:normAutofit/>
+          </a:bodyPr>
+          <a:lstStyle/>
+          <a:p>
+            <a:r>
+              <a:rPr lang="ru-RU" sz="5400" dirty="0">
+                <a:solidFill>
+                  <a:schemeClr val="tx1"/>
+                </a:solidFill>
+              </a:rPr>
+              <a:t>Реализация</a:t>
+            </a:r>
+            <a:endParaRPr lang="en-US" sz="5400" dirty="0">
+              <a:solidFill>
+                <a:schemeClr val="tx1"/>
+              </a:solidFill>
+            </a:endParaRPr>
+          </a:p>
+        </p:txBody>
+      </p:sp>
+      <p:sp>
+        <p:nvSpPr>
+          <p:cNvPr id="14" name="sketchy line">
+            <a:extLst>
+              <a:ext uri="{FF2B5EF4-FFF2-40B4-BE49-F238E27FC236}">
+                <a16:creationId xmlns:a16="http://schemas.microsoft.com/office/drawing/2014/main" id="{D4974D33-8DC5-464E-8C6D-BE58F0669C17}"/>
+              </a:ext>
+              <a:ext uri="{C183D7F6-B498-43B3-948B-1728B52AA6E4}">
+                <adec:decorative xmlns:adec="http://schemas.microsoft.com/office/drawing/2017/decorative" val="1"/>
+              </a:ext>
+            </a:extLst>
+          </p:cNvPr>
+          <p:cNvSpPr>
+            <a:spLocks noGrp="1" noRot="1" noChangeAspect="1" noMove="1" noResize="1" noEditPoints="1" noAdjustHandles="1" noChangeArrowheads="1" noChangeShapeType="1" noTextEdit="1"/>
+          </p:cNvSpPr>
+          <p:nvPr>
+            <p:extLst>
+              <p:ext uri="{386F3935-93C4-4BCD-93E2-E3B085C9AB24}">
+                <p16:designElem xmlns:p16="http://schemas.microsoft.com/office/powerpoint/2015/main" val="1"/>
+              </p:ext>
+            </p:extLst>
+          </p:nvPr>
+        </p:nvSpPr>
+        <p:spPr>
+          <a:xfrm>
+            <a:off x="640080" y="2586994"/>
+            <a:ext cx="3474720" cy="18288"/>
+          </a:xfrm>
+          <a:custGeom>
+            <a:avLst/>
+            <a:gdLst>
+              <a:gd name="connsiteX0" fmla="*/ 0 w 3474720"/>
+              <a:gd name="connsiteY0" fmla="*/ 0 h 18288"/>
+              <a:gd name="connsiteX1" fmla="*/ 694944 w 3474720"/>
+              <a:gd name="connsiteY1" fmla="*/ 0 h 18288"/>
+              <a:gd name="connsiteX2" fmla="*/ 1355141 w 3474720"/>
+              <a:gd name="connsiteY2" fmla="*/ 0 h 18288"/>
+              <a:gd name="connsiteX3" fmla="*/ 2015338 w 3474720"/>
+              <a:gd name="connsiteY3" fmla="*/ 0 h 18288"/>
+              <a:gd name="connsiteX4" fmla="*/ 2779776 w 3474720"/>
+              <a:gd name="connsiteY4" fmla="*/ 0 h 18288"/>
+              <a:gd name="connsiteX5" fmla="*/ 3474720 w 3474720"/>
+              <a:gd name="connsiteY5" fmla="*/ 0 h 18288"/>
+              <a:gd name="connsiteX6" fmla="*/ 3474720 w 3474720"/>
+              <a:gd name="connsiteY6" fmla="*/ 18288 h 18288"/>
+              <a:gd name="connsiteX7" fmla="*/ 2779776 w 3474720"/>
+              <a:gd name="connsiteY7" fmla="*/ 18288 h 18288"/>
+              <a:gd name="connsiteX8" fmla="*/ 2189074 w 3474720"/>
+              <a:gd name="connsiteY8" fmla="*/ 18288 h 18288"/>
+              <a:gd name="connsiteX9" fmla="*/ 1528877 w 3474720"/>
+              <a:gd name="connsiteY9" fmla="*/ 18288 h 18288"/>
+              <a:gd name="connsiteX10" fmla="*/ 868680 w 3474720"/>
+              <a:gd name="connsiteY10" fmla="*/ 18288 h 18288"/>
+              <a:gd name="connsiteX11" fmla="*/ 0 w 3474720"/>
+              <a:gd name="connsiteY11" fmla="*/ 18288 h 18288"/>
+              <a:gd name="connsiteX12" fmla="*/ 0 w 3474720"/>
+              <a:gd name="connsiteY12" fmla="*/ 0 h 18288"/>
+            </a:gdLst>
+            <a:ahLst/>
+            <a:cxnLst>
+              <a:cxn ang="0">
+                <a:pos x="connsiteX0" y="connsiteY0"/>
+              </a:cxn>
+              <a:cxn ang="0">
+                <a:pos x="connsiteX1" y="connsiteY1"/>
+              </a:cxn>
+              <a:cxn ang="0">
+                <a:pos x="connsiteX2" y="connsiteY2"/>
+              </a:cxn>
+              <a:cxn ang="0">
+                <a:pos x="connsiteX3" y="connsiteY3"/>
+              </a:cxn>
+              <a:cxn ang="0">
+                <a:pos x="connsiteX4" y="connsiteY4"/>
+              </a:cxn>
+              <a:cxn ang="0">
+                <a:pos x="connsiteX5" y="connsiteY5"/>
+              </a:cxn>
+              <a:cxn ang="0">
+                <a:pos x="connsiteX6" y="connsiteY6"/>
+              </a:cxn>
+              <a:cxn ang="0">
+                <a:pos x="connsiteX7" y="connsiteY7"/>
+              </a:cxn>
+              <a:cxn ang="0">
+                <a:pos x="connsiteX8" y="connsiteY8"/>
+              </a:cxn>
+              <a:cxn ang="0">
+                <a:pos x="connsiteX9" y="connsiteY9"/>
+              </a:cxn>
+              <a:cxn ang="0">
+                <a:pos x="connsiteX10" y="connsiteY10"/>
+              </a:cxn>
+              <a:cxn ang="0">
+                <a:pos x="connsiteX11" y="connsiteY11"/>
+              </a:cxn>
+              <a:cxn ang="0">
+                <a:pos x="connsiteX12" y="connsiteY12"/>
+              </a:cxn>
+            </a:cxnLst>
+            <a:rect l="l" t="t" r="r" b="b"/>
+            <a:pathLst>
+              <a:path w="3474720" h="18288" fill="none" extrusionOk="0">
+                <a:moveTo>
+                  <a:pt x="0" y="0"/>
+                </a:moveTo>
+                <a:cubicBezTo>
+                  <a:pt x="224454" y="-14544"/>
+                  <a:pt x="495407" y="26540"/>
+                  <a:pt x="694944" y="0"/>
+                </a:cubicBezTo>
+                <a:cubicBezTo>
+                  <a:pt x="894481" y="-26540"/>
+                  <a:pt x="1130063" y="24713"/>
+                  <a:pt x="1355141" y="0"/>
+                </a:cubicBezTo>
+                <a:cubicBezTo>
+                  <a:pt x="1580219" y="-24713"/>
+                  <a:pt x="1820099" y="26695"/>
+                  <a:pt x="2015338" y="0"/>
+                </a:cubicBezTo>
+                <a:cubicBezTo>
+                  <a:pt x="2210577" y="-26695"/>
+                  <a:pt x="2402045" y="165"/>
+                  <a:pt x="2779776" y="0"/>
+                </a:cubicBezTo>
+                <a:cubicBezTo>
+                  <a:pt x="3157507" y="-165"/>
+                  <a:pt x="3286859" y="-15571"/>
+                  <a:pt x="3474720" y="0"/>
+                </a:cubicBezTo>
+                <a:cubicBezTo>
+                  <a:pt x="3474286" y="7551"/>
+                  <a:pt x="3474253" y="9822"/>
+                  <a:pt x="3474720" y="18288"/>
+                </a:cubicBezTo>
+                <a:cubicBezTo>
+                  <a:pt x="3233904" y="29845"/>
+                  <a:pt x="2945134" y="-5256"/>
+                  <a:pt x="2779776" y="18288"/>
+                </a:cubicBezTo>
+                <a:cubicBezTo>
+                  <a:pt x="2614418" y="41832"/>
+                  <a:pt x="2339768" y="22709"/>
+                  <a:pt x="2189074" y="18288"/>
+                </a:cubicBezTo>
+                <a:cubicBezTo>
+                  <a:pt x="2038380" y="13867"/>
+                  <a:pt x="1817434" y="-4947"/>
+                  <a:pt x="1528877" y="18288"/>
+                </a:cubicBezTo>
+                <a:cubicBezTo>
+                  <a:pt x="1240320" y="41523"/>
+                  <a:pt x="1042447" y="37198"/>
+                  <a:pt x="868680" y="18288"/>
+                </a:cubicBezTo>
+                <a:cubicBezTo>
+                  <a:pt x="694913" y="-622"/>
+                  <a:pt x="233232" y="44909"/>
+                  <a:pt x="0" y="18288"/>
+                </a:cubicBezTo>
+                <a:cubicBezTo>
+                  <a:pt x="60" y="11696"/>
+                  <a:pt x="66" y="3758"/>
+                  <a:pt x="0" y="0"/>
+                </a:cubicBezTo>
+                <a:close/>
+              </a:path>
+              <a:path w="3474720" h="18288" stroke="0" extrusionOk="0">
+                <a:moveTo>
+                  <a:pt x="0" y="0"/>
+                </a:moveTo>
+                <a:cubicBezTo>
+                  <a:pt x="202328" y="-14716"/>
+                  <a:pt x="332722" y="-11499"/>
+                  <a:pt x="625450" y="0"/>
+                </a:cubicBezTo>
+                <a:cubicBezTo>
+                  <a:pt x="918178" y="11499"/>
+                  <a:pt x="1096688" y="5123"/>
+                  <a:pt x="1389888" y="0"/>
+                </a:cubicBezTo>
+                <a:cubicBezTo>
+                  <a:pt x="1683088" y="-5123"/>
+                  <a:pt x="1835981" y="-14038"/>
+                  <a:pt x="1980590" y="0"/>
+                </a:cubicBezTo>
+                <a:cubicBezTo>
+                  <a:pt x="2125199" y="14038"/>
+                  <a:pt x="2396099" y="-7203"/>
+                  <a:pt x="2571293" y="0"/>
+                </a:cubicBezTo>
+                <a:cubicBezTo>
+                  <a:pt x="2746487" y="7203"/>
+                  <a:pt x="3041609" y="-12036"/>
+                  <a:pt x="3474720" y="0"/>
+                </a:cubicBezTo>
+                <a:cubicBezTo>
+                  <a:pt x="3474638" y="4406"/>
+                  <a:pt x="3474631" y="9982"/>
+                  <a:pt x="3474720" y="18288"/>
+                </a:cubicBezTo>
+                <a:cubicBezTo>
+                  <a:pt x="3324873" y="21876"/>
+                  <a:pt x="3136771" y="12587"/>
+                  <a:pt x="2814523" y="18288"/>
+                </a:cubicBezTo>
+                <a:cubicBezTo>
+                  <a:pt x="2492275" y="23989"/>
+                  <a:pt x="2294402" y="47111"/>
+                  <a:pt x="2154326" y="18288"/>
+                </a:cubicBezTo>
+                <a:cubicBezTo>
+                  <a:pt x="2014250" y="-10535"/>
+                  <a:pt x="1820317" y="33903"/>
+                  <a:pt x="1494130" y="18288"/>
+                </a:cubicBezTo>
+                <a:cubicBezTo>
+                  <a:pt x="1167943" y="2673"/>
+                  <a:pt x="948432" y="14868"/>
+                  <a:pt x="729691" y="18288"/>
+                </a:cubicBezTo>
+                <a:cubicBezTo>
+                  <a:pt x="510950" y="21708"/>
+                  <a:pt x="264032" y="24354"/>
+                  <a:pt x="0" y="18288"/>
+                </a:cubicBezTo>
+                <a:cubicBezTo>
+                  <a:pt x="189" y="14288"/>
+                  <a:pt x="-703" y="3747"/>
+                  <a:pt x="0" y="0"/>
+                </a:cubicBezTo>
+                <a:close/>
+              </a:path>
+            </a:pathLst>
+          </a:custGeom>
+          <a:solidFill>
+            <a:schemeClr val="accent2"/>
+          </a:solidFill>
+          <a:ln w="44450" cap="rnd">
+            <a:solidFill>
+              <a:schemeClr val="accent2"/>
+            </a:solidFill>
+            <a:round/>
+            <a:extLst>
+              <a:ext uri="{C807C97D-BFC1-408E-A445-0C87EB9F89A2}">
+                <ask:lineSketchStyleProps xmlns:ask="http://schemas.microsoft.com/office/drawing/2018/sketchyshapes" sd="2863741219">
+                  <a:prstGeom prst="rect">
+                    <a:avLst/>
+                  </a:prstGeom>
+                  <ask:type>
+                    <ask:lineSketchFreehand/>
+                  </ask:type>
+                </ask:lineSketchStyleProps>
+              </a:ext>
+            </a:extLst>
+          </a:ln>
+        </p:spPr>
+        <p:style>
+          <a:lnRef idx="2">
+            <a:schemeClr val="accent1">
+              <a:shade val="50000"/>
+            </a:schemeClr>
+          </a:lnRef>
+          <a:fillRef idx="1">
+            <a:schemeClr val="accent1"/>
+          </a:fillRef>
+          <a:effectRef idx="0">
+            <a:schemeClr val="accent1"/>
+          </a:effectRef>
+          <a:fontRef idx="minor">
+            <a:schemeClr val="lt1"/>
+          </a:fontRef>
+        </p:style>
+        <p:txBody>
+          <a:bodyPr rtlCol="0" anchor="ctr"/>
+          <a:lstStyle/>
+          <a:p>
+            <a:pPr algn="ctr"/>
+            <a:endParaRPr lang="en-US"/>
+          </a:p>
+        </p:txBody>
+      </p:sp>
+      <p:sp>
+        <p:nvSpPr>
+          <p:cNvPr id="9" name="Content Placeholder 8">
+            <a:extLst>
+              <a:ext uri="{FF2B5EF4-FFF2-40B4-BE49-F238E27FC236}">
+                <a16:creationId xmlns:a16="http://schemas.microsoft.com/office/drawing/2014/main" id="{B8F5EF3E-BAA8-F263-3E06-17C068D536B2}"/>
+              </a:ext>
+            </a:extLst>
+          </p:cNvPr>
+          <p:cNvSpPr>
+            <a:spLocks noGrp="1"/>
+          </p:cNvSpPr>
+          <p:nvPr>
+            <p:ph sz="quarter" idx="10"/>
+          </p:nvPr>
+        </p:nvSpPr>
+        <p:spPr>
+          <a:xfrm>
+            <a:off x="640080" y="2872899"/>
+            <a:ext cx="4243589" cy="3320668"/>
+          </a:xfrm>
+        </p:spPr>
+        <p:txBody>
+          <a:bodyPr vert="horz" lIns="91440" tIns="45720" rIns="91440" bIns="45720" rtlCol="0">
+            <a:normAutofit/>
+          </a:bodyPr>
+          <a:lstStyle/>
+          <a:p>
+            <a:r>
+              <a:rPr lang="en-US" sz="2200" dirty="0">
+                <a:solidFill>
+                  <a:schemeClr val="tx1"/>
+                </a:solidFill>
+              </a:rPr>
+              <a:t>24 </a:t>
+            </a:r>
+            <a:r>
+              <a:rPr lang="ru-RU" sz="2200" dirty="0">
+                <a:solidFill>
+                  <a:schemeClr val="tx1"/>
+                </a:solidFill>
+              </a:rPr>
+              <a:t>класса</a:t>
+            </a:r>
+          </a:p>
+          <a:p>
+            <a:r>
+              <a:rPr lang="ru-RU" sz="2200" dirty="0">
+                <a:solidFill>
+                  <a:schemeClr val="tx1"/>
+                </a:solidFill>
+              </a:rPr>
+              <a:t>77 функций</a:t>
+            </a:r>
+            <a:endParaRPr lang="en-US" sz="2200" dirty="0">
+              <a:solidFill>
+                <a:schemeClr val="tx1"/>
+              </a:solidFill>
+            </a:endParaRPr>
+          </a:p>
+        </p:txBody>
+      </p:sp>
+      <p:pic>
+        <p:nvPicPr>
+          <p:cNvPr id="5" name="Объект 4" descr="Изображение выглядит как текст, снимок экрана&#10;&#10;Автоматически созданное описание">
+            <a:extLst>
+              <a:ext uri="{FF2B5EF4-FFF2-40B4-BE49-F238E27FC236}">
+                <a16:creationId xmlns:a16="http://schemas.microsoft.com/office/drawing/2014/main" id="{6B47DC20-2C87-BAD3-4740-2A2FB08E073C}"/>
+              </a:ext>
+            </a:extLst>
+          </p:cNvPr>
+          <p:cNvPicPr>
+            <a:picLocks noChangeAspect="1"/>
+          </p:cNvPicPr>
+          <p:nvPr/>
+        </p:nvPicPr>
+        <p:blipFill rotWithShape="1">
+          <a:blip r:embed="rId2"/>
+          <a:srcRect r="35054" b="1"/>
+          <a:stretch/>
+        </p:blipFill>
+        <p:spPr>
+          <a:xfrm>
+            <a:off x="5311702" y="10"/>
+            <a:ext cx="6878775" cy="6857990"/>
+          </a:xfrm>
+          <a:custGeom>
+            <a:avLst/>
+            <a:gdLst/>
+            <a:ahLst/>
+            <a:cxnLst/>
+            <a:rect l="l" t="t" r="r" b="b"/>
+            <a:pathLst>
+              <a:path w="6878775" h="6858000">
+                <a:moveTo>
+                  <a:pt x="1102973" y="0"/>
+                </a:moveTo>
+                <a:lnTo>
+                  <a:pt x="1160688" y="0"/>
+                </a:lnTo>
+                <a:lnTo>
+                  <a:pt x="983189" y="331786"/>
+                </a:lnTo>
+                <a:cubicBezTo>
+                  <a:pt x="914866" y="469145"/>
+                  <a:pt x="850355" y="608712"/>
+                  <a:pt x="789261" y="750263"/>
+                </a:cubicBezTo>
+                <a:cubicBezTo>
+                  <a:pt x="774307" y="784928"/>
+                  <a:pt x="759992" y="819849"/>
+                  <a:pt x="745295" y="854514"/>
+                </a:cubicBezTo>
+                <a:cubicBezTo>
+                  <a:pt x="756682" y="845393"/>
+                  <a:pt x="765489" y="833492"/>
+                  <a:pt x="770857" y="819975"/>
+                </a:cubicBezTo>
+                <a:cubicBezTo>
+                  <a:pt x="879943" y="589569"/>
+                  <a:pt x="999605" y="365513"/>
+                  <a:pt x="1131329" y="148742"/>
+                </a:cubicBezTo>
+                <a:lnTo>
+                  <a:pt x="1227589" y="0"/>
+                </a:lnTo>
+                <a:lnTo>
+                  <a:pt x="6878775" y="0"/>
+                </a:lnTo>
+                <a:lnTo>
+                  <a:pt x="6878775" y="6858000"/>
+                </a:lnTo>
+                <a:lnTo>
+                  <a:pt x="713521" y="6858000"/>
+                </a:lnTo>
+                <a:lnTo>
+                  <a:pt x="625642" y="6670527"/>
+                </a:lnTo>
+                <a:cubicBezTo>
+                  <a:pt x="507232" y="6398531"/>
+                  <a:pt x="403083" y="6118381"/>
+                  <a:pt x="312785" y="5830359"/>
+                </a:cubicBezTo>
+                <a:cubicBezTo>
+                  <a:pt x="278149" y="5719759"/>
+                  <a:pt x="248879" y="5607635"/>
+                  <a:pt x="212198" y="5480401"/>
+                </a:cubicBezTo>
+                <a:cubicBezTo>
+                  <a:pt x="212208" y="5491601"/>
+                  <a:pt x="212803" y="5502788"/>
+                  <a:pt x="213988" y="5513923"/>
+                </a:cubicBezTo>
+                <a:cubicBezTo>
+                  <a:pt x="264089" y="5723695"/>
+                  <a:pt x="307290" y="5935370"/>
+                  <a:pt x="365826" y="6142729"/>
+                </a:cubicBezTo>
+                <a:cubicBezTo>
+                  <a:pt x="433152" y="6380817"/>
+                  <a:pt x="510068" y="6614016"/>
+                  <a:pt x="597975" y="6841549"/>
+                </a:cubicBezTo>
+                <a:lnTo>
+                  <a:pt x="604824" y="6858000"/>
+                </a:lnTo>
+                <a:lnTo>
+                  <a:pt x="552056" y="6858000"/>
+                </a:lnTo>
+                <a:lnTo>
+                  <a:pt x="539576" y="6828295"/>
+                </a:lnTo>
+                <a:cubicBezTo>
+                  <a:pt x="380597" y="6414594"/>
+                  <a:pt x="260223" y="5988893"/>
+                  <a:pt x="171555" y="5552906"/>
+                </a:cubicBezTo>
+                <a:cubicBezTo>
+                  <a:pt x="91163" y="5157998"/>
+                  <a:pt x="43746" y="4758899"/>
+                  <a:pt x="12305" y="4357388"/>
+                </a:cubicBezTo>
+                <a:cubicBezTo>
+                  <a:pt x="-14281" y="4013908"/>
+                  <a:pt x="4507" y="3672965"/>
+                  <a:pt x="46684" y="3331516"/>
+                </a:cubicBezTo>
+                <a:cubicBezTo>
+                  <a:pt x="127203" y="2664286"/>
+                  <a:pt x="277819" y="2007265"/>
+                  <a:pt x="496065" y="1371196"/>
+                </a:cubicBezTo>
+                <a:cubicBezTo>
+                  <a:pt x="636273" y="966066"/>
+                  <a:pt x="800445" y="573253"/>
+                  <a:pt x="995723" y="196614"/>
+                </a:cubicBezTo>
+                <a:close/>
+              </a:path>
+            </a:pathLst>
+          </a:custGeom>
+        </p:spPr>
+      </p:pic>
+    </p:spTree>
+    <p:extLst>
+      <p:ext uri="{BB962C8B-B14F-4D97-AF65-F5344CB8AC3E}">
+        <p14:creationId xmlns:p14="http://schemas.microsoft.com/office/powerpoint/2010/main" val="2840262687"/>
+      </p:ext>
+    </p:extLst>
+  </p:cSld>
+  <p:clrMapOvr>
+    <a:masterClrMapping/>
+  </p:clrMapOvr>
+</p:sld>
+</file>
+
+<file path=ppt/slides/slide7.xml><?xml version="1.0" encoding="utf-8"?>
+<p:sld xmlns:a="http://schemas.openxmlformats.org/drawingml/2006/main" xmlns:r="http://schemas.openxmlformats.org/officeDocument/2006/relationships" xmlns:p="http://schemas.openxmlformats.org/presentationml/2006/main">
+  <p:cSld>
+    <p:bg>
+      <p:bgPr>
+        <a:solidFill>
+          <a:schemeClr val="bg1"/>
+        </a:solidFill>
+        <a:effectLst/>
+      </p:bgPr>
+    </p:bg>
+    <p:spTree>
+      <p:nvGrpSpPr>
+        <p:cNvPr id="1" name=""/>
+        <p:cNvGrpSpPr/>
+        <p:nvPr/>
+      </p:nvGrpSpPr>
+      <p:grpSpPr>
+        <a:xfrm>
+          <a:off x="0" y="0"/>
+          <a:ext cx="0" cy="0"/>
+          <a:chOff x="0" y="0"/>
+          <a:chExt cx="0" cy="0"/>
+        </a:xfrm>
+      </p:grpSpPr>
       <p:sp>
         <p:nvSpPr>
           <p:cNvPr id="1031" name="Rectangle 1030">
@@ -9381,67 +10360,49 @@
           <a:lstStyle/>
           <a:p>
             <a:r>
-              <a:rPr lang="en-US" sz="4000">
+              <a:rPr lang="en-US" sz="4000" dirty="0" err="1">
                 <a:solidFill>
                   <a:srgbClr val="FFFFFF"/>
                 </a:solidFill>
               </a:rPr>
-              <a:t>Модельки и спрайты</a:t>
+              <a:t>Модел</a:t>
+            </a:r>
+            <a:r>
+              <a:rPr lang="ru-RU" sz="4000" dirty="0">
+                <a:solidFill>
+                  <a:srgbClr val="FFFFFF"/>
+                </a:solidFill>
+              </a:rPr>
+              <a:t>и</a:t>
+            </a:r>
+            <a:r>
+              <a:rPr lang="en-US" sz="4000" dirty="0">
+                <a:solidFill>
+                  <a:srgbClr val="FFFFFF"/>
+                </a:solidFill>
+              </a:rPr>
+              <a:t> и </a:t>
+            </a:r>
+            <a:r>
+              <a:rPr lang="en-US" sz="4000" dirty="0" err="1">
+                <a:solidFill>
+                  <a:srgbClr val="FFFFFF"/>
+                </a:solidFill>
+              </a:rPr>
+              <a:t>спрайты</a:t>
             </a:r>
             <a:br>
-              <a:rPr lang="en-US" sz="4000">
+              <a:rPr lang="en-US" sz="4000" dirty="0">
                 <a:solidFill>
                   <a:srgbClr val="FFFFFF"/>
                 </a:solidFill>
               </a:rPr>
             </a:br>
-            <a:endParaRPr lang="en-US" sz="4000">
+            <a:endParaRPr lang="en-US" sz="4000" dirty="0">
               <a:solidFill>
                 <a:srgbClr val="FFFFFF"/>
               </a:solidFill>
             </a:endParaRPr>
-          </a:p>
-        </p:txBody>
-      </p:sp>
-      <p:sp>
-        <p:nvSpPr>
-          <p:cNvPr id="3" name="Объект 2">
-            <a:extLst>
-              <a:ext uri="{FF2B5EF4-FFF2-40B4-BE49-F238E27FC236}">
-                <a16:creationId xmlns:a16="http://schemas.microsoft.com/office/drawing/2014/main" id="{FF6E43FC-0234-CE3F-5E23-E3C9A8D1B74D}"/>
-              </a:ext>
-            </a:extLst>
-          </p:cNvPr>
-          <p:cNvSpPr>
-            <a:spLocks noGrp="1"/>
-          </p:cNvSpPr>
-          <p:nvPr>
-            <p:ph sz="quarter" idx="10"/>
-          </p:nvPr>
-        </p:nvSpPr>
-        <p:spPr>
-          <a:xfrm>
-            <a:off x="762000" y="4792531"/>
-            <a:ext cx="5334000" cy="1089423"/>
-          </a:xfrm>
-        </p:spPr>
-        <p:txBody>
-          <a:bodyPr vert="horz" lIns="91440" tIns="45720" rIns="91440" bIns="45720" rtlCol="0" anchor="b">
-            <a:normAutofit/>
-          </a:bodyPr>
-          <a:lstStyle/>
-          <a:p>
-            <a:pPr marL="0" indent="0">
-              <a:buNone/>
-            </a:pPr>
-            <a:r>
-              <a:rPr lang="en-US" sz="1800">
-                <a:solidFill>
-                  <a:srgbClr val="FFFFFF"/>
-                </a:solidFill>
-              </a:rPr>
-              <a:t>Все картинки в игре нарисованы нейро сетью</a:t>
-            </a:r>
           </a:p>
         </p:txBody>
       </p:sp>
@@ -9507,102 +10468,10 @@
   <p:clrMapOvr>
     <a:masterClrMapping/>
   </p:clrMapOvr>
-  <p:timing>
-    <p:tnLst>
-      <p:par>
-        <p:cTn id="1" dur="indefinite" restart="never" nodeType="tmRoot">
-          <p:childTnLst>
-            <p:seq concurrent="1" nextAc="seek">
-              <p:cTn id="2" dur="indefinite" nodeType="mainSeq">
-                <p:childTnLst>
-                  <p:par>
-                    <p:cTn id="3" fill="hold">
-                      <p:stCondLst>
-                        <p:cond delay="indefinite"/>
-                        <p:cond evt="onBegin" delay="0">
-                          <p:tn val="2"/>
-                        </p:cond>
-                      </p:stCondLst>
-                      <p:childTnLst>
-                        <p:par>
-                          <p:cTn id="4" fill="hold">
-                            <p:stCondLst>
-                              <p:cond delay="0"/>
-                            </p:stCondLst>
-                            <p:childTnLst>
-                              <p:par>
-                                <p:cTn id="5" presetID="10" presetClass="entr" presetSubtype="0" fill="hold" grpId="0" nodeType="withEffect">
-                                  <p:stCondLst>
-                                    <p:cond delay="1000"/>
-                                  </p:stCondLst>
-                                  <p:iterate type="lt">
-                                    <p:tmPct val="10000"/>
-                                  </p:iterate>
-                                  <p:childTnLst>
-                                    <p:set>
-                                      <p:cBhvr>
-                                        <p:cTn id="6" dur="1" fill="hold">
-                                          <p:stCondLst>
-                                            <p:cond delay="0"/>
-                                          </p:stCondLst>
-                                        </p:cTn>
-                                        <p:tgtEl>
-                                          <p:spTgt spid="2"/>
-                                        </p:tgtEl>
-                                        <p:attrNameLst>
-                                          <p:attrName>style.visibility</p:attrName>
-                                        </p:attrNameLst>
-                                      </p:cBhvr>
-                                      <p:to>
-                                        <p:strVal val="visible"/>
-                                      </p:to>
-                                    </p:set>
-                                    <p:animEffect transition="in" filter="fade">
-                                      <p:cBhvr>
-                                        <p:cTn id="7" dur="400"/>
-                                        <p:tgtEl>
-                                          <p:spTgt spid="2"/>
-                                        </p:tgtEl>
-                                      </p:cBhvr>
-                                    </p:animEffect>
-                                  </p:childTnLst>
-                                </p:cTn>
-                              </p:par>
-                            </p:childTnLst>
-                          </p:cTn>
-                        </p:par>
-                      </p:childTnLst>
-                    </p:cTn>
-                  </p:par>
-                </p:childTnLst>
-              </p:cTn>
-              <p:prevCondLst>
-                <p:cond evt="onPrev" delay="0">
-                  <p:tgtEl>
-                    <p:sldTgt/>
-                  </p:tgtEl>
-                </p:cond>
-              </p:prevCondLst>
-              <p:nextCondLst>
-                <p:cond evt="onNext" delay="0">
-                  <p:tgtEl>
-                    <p:sldTgt/>
-                  </p:tgtEl>
-                </p:cond>
-              </p:nextCondLst>
-            </p:seq>
-          </p:childTnLst>
-        </p:cTn>
-      </p:par>
-    </p:tnLst>
-    <p:bldLst>
-      <p:bldP spid="2" grpId="0"/>
-    </p:bldLst>
-  </p:timing>
 </p:sld>
 </file>
 
-<file path=ppt/slides/slide7.xml><?xml version="1.0" encoding="utf-8"?>
+<file path=ppt/slides/slide8.xml><?xml version="1.0" encoding="utf-8"?>
 <p:sld xmlns:a="http://schemas.openxmlformats.org/drawingml/2006/main" xmlns:r="http://schemas.openxmlformats.org/officeDocument/2006/relationships" xmlns:p="http://schemas.openxmlformats.org/presentationml/2006/main" showMasterSp="0">
   <p:cSld>
     <p:bg>
@@ -9659,45 +10528,6 @@
           </a:xfrm>
         </p:spPr>
       </p:pic>
-      <p:sp>
-        <p:nvSpPr>
-          <p:cNvPr id="6" name="TextBox 5">
-            <a:extLst>
-              <a:ext uri="{FF2B5EF4-FFF2-40B4-BE49-F238E27FC236}">
-                <a16:creationId xmlns:a16="http://schemas.microsoft.com/office/drawing/2014/main" id="{F38EBF76-931D-7206-0695-42281DAEDC6A}"/>
-              </a:ext>
-            </a:extLst>
-          </p:cNvPr>
-          <p:cNvSpPr txBox="1"/>
-          <p:nvPr/>
-        </p:nvSpPr>
-        <p:spPr>
-          <a:xfrm>
-            <a:off x="594341" y="649716"/>
-            <a:ext cx="4865615" cy="646331"/>
-          </a:xfrm>
-          <a:prstGeom prst="rect">
-            <a:avLst/>
-          </a:prstGeom>
-          <a:noFill/>
-        </p:spPr>
-        <p:txBody>
-          <a:bodyPr wrap="square" rtlCol="0">
-            <a:spAutoFit/>
-          </a:bodyPr>
-          <a:lstStyle/>
-          <a:p>
-            <a:r>
-              <a:rPr lang="ru-RU" sz="3600" dirty="0">
-                <a:solidFill>
-                  <a:schemeClr val="bg1"/>
-                </a:solidFill>
-              </a:rPr>
-              <a:t>Реализованы меню</a:t>
-            </a:r>
-          </a:p>
-        </p:txBody>
-      </p:sp>
       <p:pic>
         <p:nvPicPr>
           <p:cNvPr id="3" name="Рисунок 2" descr="Изображение выглядит как пиксель, снимок экрана, текст, Программное обеспечение для видеоигр&#10;&#10;Автоматически созданное описание">
@@ -9741,13 +10571,15 @@
 </p:sld>
 </file>
 
-<file path=ppt/slides/slide8.xml><?xml version="1.0" encoding="utf-8"?>
-<p:sld xmlns:a="http://schemas.openxmlformats.org/drawingml/2006/main" xmlns:r="http://schemas.openxmlformats.org/officeDocument/2006/relationships" xmlns:p="http://schemas.openxmlformats.org/presentationml/2006/main">
+<file path=ppt/slides/slide9.xml><?xml version="1.0" encoding="utf-8"?>
+<p:sld xmlns:a="http://schemas.openxmlformats.org/drawingml/2006/main" xmlns:r="http://schemas.openxmlformats.org/officeDocument/2006/relationships" xmlns:p="http://schemas.openxmlformats.org/presentationml/2006/main" showMasterSp="0">
   <p:cSld>
     <p:bg>
       <p:bgPr>
         <a:solidFill>
-          <a:schemeClr val="bg1"/>
+          <a:schemeClr val="bg2">
+            <a:lumMod val="50000"/>
+          </a:schemeClr>
         </a:solidFill>
         <a:effectLst/>
       </p:bgPr>
@@ -9799,127 +10631,6 @@
     <p:extLst>
       <p:ext uri="{BB962C8B-B14F-4D97-AF65-F5344CB8AC3E}">
         <p14:creationId xmlns:p14="http://schemas.microsoft.com/office/powerpoint/2010/main" val="4109042922"/>
-      </p:ext>
-    </p:extLst>
-  </p:cSld>
-  <p:clrMapOvr>
-    <a:masterClrMapping/>
-  </p:clrMapOvr>
-</p:sld>
-</file>
-
-<file path=ppt/slides/slide9.xml><?xml version="1.0" encoding="utf-8"?>
-<p:sld xmlns:a="http://schemas.openxmlformats.org/drawingml/2006/main" xmlns:r="http://schemas.openxmlformats.org/officeDocument/2006/relationships" xmlns:p="http://schemas.openxmlformats.org/presentationml/2006/main">
-  <p:cSld>
-    <p:spTree>
-      <p:nvGrpSpPr>
-        <p:cNvPr id="1" name=""/>
-        <p:cNvGrpSpPr/>
-        <p:nvPr/>
-      </p:nvGrpSpPr>
-      <p:grpSpPr>
-        <a:xfrm>
-          <a:off x="0" y="0"/>
-          <a:ext cx="0" cy="0"/>
-          <a:chOff x="0" y="0"/>
-          <a:chExt cx="0" cy="0"/>
-        </a:xfrm>
-      </p:grpSpPr>
-      <p:sp>
-        <p:nvSpPr>
-          <p:cNvPr id="2" name="Заголовок 1">
-            <a:extLst>
-              <a:ext uri="{FF2B5EF4-FFF2-40B4-BE49-F238E27FC236}">
-                <a16:creationId xmlns:a16="http://schemas.microsoft.com/office/drawing/2014/main" id="{C098F19B-805A-FAB0-FDB9-98B200434096}"/>
-              </a:ext>
-            </a:extLst>
-          </p:cNvPr>
-          <p:cNvSpPr>
-            <a:spLocks noGrp="1"/>
-          </p:cNvSpPr>
-          <p:nvPr>
-            <p:ph type="title"/>
-          </p:nvPr>
-        </p:nvSpPr>
-        <p:spPr/>
-        <p:txBody>
-          <a:bodyPr/>
-          <a:lstStyle/>
-          <a:p>
-            <a:r>
-              <a:rPr lang="ru-RU" dirty="0"/>
-              <a:t>Итоги</a:t>
-            </a:r>
-          </a:p>
-        </p:txBody>
-      </p:sp>
-      <p:sp>
-        <p:nvSpPr>
-          <p:cNvPr id="3" name="Объект 2">
-            <a:extLst>
-              <a:ext uri="{FF2B5EF4-FFF2-40B4-BE49-F238E27FC236}">
-                <a16:creationId xmlns:a16="http://schemas.microsoft.com/office/drawing/2014/main" id="{C5E96C2F-1C08-6598-C8B7-757FE11843D3}"/>
-              </a:ext>
-            </a:extLst>
-          </p:cNvPr>
-          <p:cNvSpPr>
-            <a:spLocks noGrp="1"/>
-          </p:cNvSpPr>
-          <p:nvPr>
-            <p:ph sz="quarter" idx="10"/>
-          </p:nvPr>
-        </p:nvSpPr>
-        <p:spPr/>
-        <p:txBody>
-          <a:bodyPr>
-            <a:normAutofit/>
-          </a:bodyPr>
-          <a:lstStyle/>
-          <a:p>
-            <a:pPr marL="0" indent="0">
-              <a:buNone/>
-            </a:pPr>
-            <a:r>
-              <a:rPr lang="ru-RU" sz="1600" dirty="0"/>
-              <a:t>Улучшить</a:t>
-            </a:r>
-          </a:p>
-          <a:p>
-            <a:r>
-              <a:rPr lang="ru-RU" sz="1600" dirty="0"/>
-              <a:t>Добавление нового оружия</a:t>
-            </a:r>
-          </a:p>
-          <a:p>
-            <a:r>
-              <a:rPr lang="ru-RU" sz="1600" dirty="0"/>
-              <a:t>Большее количество уровней</a:t>
-            </a:r>
-          </a:p>
-          <a:p>
-            <a:r>
-              <a:rPr lang="ru-RU" sz="1600" dirty="0"/>
-              <a:t>Разнообразие врагов</a:t>
-            </a:r>
-          </a:p>
-          <a:p>
-            <a:r>
-              <a:rPr lang="ru-RU" sz="1600" dirty="0"/>
-              <a:t>Прокачка персонажа</a:t>
-            </a:r>
-          </a:p>
-          <a:p>
-            <a:pPr marL="0" indent="0">
-              <a:buNone/>
-            </a:pPr>
-            <a:endParaRPr lang="ru-RU" sz="1600" dirty="0"/>
-          </a:p>
-        </p:txBody>
-      </p:sp>
-    </p:spTree>
-    <p:extLst>
-      <p:ext uri="{BB962C8B-B14F-4D97-AF65-F5344CB8AC3E}">
-        <p14:creationId xmlns:p14="http://schemas.microsoft.com/office/powerpoint/2010/main" val="3845412708"/>
       </p:ext>
     </p:extLst>
   </p:cSld>

</xml_diff>